<commit_message>
one slide concept card
</commit_message>
<xml_diff>
--- a/docs/conceptCards/gitHub.conceptCard.pptx
+++ b/docs/conceptCards/gitHub.conceptCard.pptx
@@ -4,18 +4,22 @@
   <p:sldMasterIdLst>
     <p:sldMasterId id="2147483648" r:id="rId1"/>
   </p:sldMasterIdLst>
+  <p:notesMasterIdLst>
+    <p:notesMasterId r:id="rId14"/>
+  </p:notesMasterIdLst>
   <p:sldIdLst>
-    <p:sldId id="258" r:id="rId2"/>
-    <p:sldId id="259" r:id="rId3"/>
-    <p:sldId id="261" r:id="rId4"/>
-    <p:sldId id="263" r:id="rId5"/>
-    <p:sldId id="267" r:id="rId6"/>
-    <p:sldId id="269" r:id="rId7"/>
-    <p:sldId id="271" r:id="rId8"/>
-    <p:sldId id="272" r:id="rId9"/>
-    <p:sldId id="268" r:id="rId10"/>
-    <p:sldId id="265" r:id="rId11"/>
-    <p:sldId id="266" r:id="rId12"/>
+    <p:sldId id="274" r:id="rId2"/>
+    <p:sldId id="258" r:id="rId3"/>
+    <p:sldId id="259" r:id="rId4"/>
+    <p:sldId id="261" r:id="rId5"/>
+    <p:sldId id="263" r:id="rId6"/>
+    <p:sldId id="267" r:id="rId7"/>
+    <p:sldId id="269" r:id="rId8"/>
+    <p:sldId id="271" r:id="rId9"/>
+    <p:sldId id="272" r:id="rId10"/>
+    <p:sldId id="268" r:id="rId11"/>
+    <p:sldId id="265" r:id="rId12"/>
+    <p:sldId id="266" r:id="rId13"/>
   </p:sldIdLst>
   <p:sldSz cx="12192000" cy="6858000"/>
   <p:notesSz cx="6858000" cy="9144000"/>
@@ -120,6 +124,464 @@
     </p:ext>
   </p:extLst>
 </p:presentation>
+</file>
+
+<file path=ppt/notesMasters/notesMaster1.xml><?xml version="1.0" encoding="utf-8"?>
+<p:notesMaster xmlns:a="http://schemas.openxmlformats.org/drawingml/2006/main" xmlns:r="http://schemas.openxmlformats.org/officeDocument/2006/relationships" xmlns:p="http://schemas.openxmlformats.org/presentationml/2006/main">
+  <p:cSld>
+    <p:bg>
+      <p:bgRef idx="1001">
+        <a:schemeClr val="bg1"/>
+      </p:bgRef>
+    </p:bg>
+    <p:spTree>
+      <p:nvGrpSpPr>
+        <p:cNvPr id="1" name=""/>
+        <p:cNvGrpSpPr/>
+        <p:nvPr/>
+      </p:nvGrpSpPr>
+      <p:grpSpPr>
+        <a:xfrm>
+          <a:off x="0" y="0"/>
+          <a:ext cx="0" cy="0"/>
+          <a:chOff x="0" y="0"/>
+          <a:chExt cx="0" cy="0"/>
+        </a:xfrm>
+      </p:grpSpPr>
+      <p:sp>
+        <p:nvSpPr>
+          <p:cNvPr id="2" name="Header Placeholder 1"/>
+          <p:cNvSpPr>
+            <a:spLocks noGrp="1"/>
+          </p:cNvSpPr>
+          <p:nvPr>
+            <p:ph type="hdr" sz="quarter"/>
+          </p:nvPr>
+        </p:nvSpPr>
+        <p:spPr>
+          <a:xfrm>
+            <a:off x="0" y="0"/>
+            <a:ext cx="2971800" cy="458788"/>
+          </a:xfrm>
+          <a:prstGeom prst="rect">
+            <a:avLst/>
+          </a:prstGeom>
+        </p:spPr>
+        <p:txBody>
+          <a:bodyPr vert="horz" lIns="91440" tIns="45720" rIns="91440" bIns="45720" rtlCol="0"/>
+          <a:lstStyle>
+            <a:lvl1pPr algn="l">
+              <a:defRPr sz="1200"/>
+            </a:lvl1pPr>
+          </a:lstStyle>
+          <a:p>
+            <a:endParaRPr lang="en-US"/>
+          </a:p>
+        </p:txBody>
+      </p:sp>
+      <p:sp>
+        <p:nvSpPr>
+          <p:cNvPr id="3" name="Date Placeholder 2"/>
+          <p:cNvSpPr>
+            <a:spLocks noGrp="1"/>
+          </p:cNvSpPr>
+          <p:nvPr>
+            <p:ph type="dt" idx="1"/>
+          </p:nvPr>
+        </p:nvSpPr>
+        <p:spPr>
+          <a:xfrm>
+            <a:off x="3884613" y="0"/>
+            <a:ext cx="2971800" cy="458788"/>
+          </a:xfrm>
+          <a:prstGeom prst="rect">
+            <a:avLst/>
+          </a:prstGeom>
+        </p:spPr>
+        <p:txBody>
+          <a:bodyPr vert="horz" lIns="91440" tIns="45720" rIns="91440" bIns="45720" rtlCol="0"/>
+          <a:lstStyle>
+            <a:lvl1pPr algn="r">
+              <a:defRPr sz="1200"/>
+            </a:lvl1pPr>
+          </a:lstStyle>
+          <a:p>
+            <a:fld id="{A9BCE02A-F7CE-E046-B975-3C4BBBE74649}" type="datetimeFigureOut">
+              <a:rPr lang="en-US" smtClean="0"/>
+              <a:t>9/12/19</a:t>
+            </a:fld>
+            <a:endParaRPr lang="en-US"/>
+          </a:p>
+        </p:txBody>
+      </p:sp>
+      <p:sp>
+        <p:nvSpPr>
+          <p:cNvPr id="4" name="Slide Image Placeholder 3"/>
+          <p:cNvSpPr>
+            <a:spLocks noGrp="1" noRot="1" noChangeAspect="1"/>
+          </p:cNvSpPr>
+          <p:nvPr>
+            <p:ph type="sldImg" idx="2"/>
+          </p:nvPr>
+        </p:nvSpPr>
+        <p:spPr>
+          <a:xfrm>
+            <a:off x="685800" y="1143000"/>
+            <a:ext cx="5486400" cy="3086100"/>
+          </a:xfrm>
+          <a:prstGeom prst="rect">
+            <a:avLst/>
+          </a:prstGeom>
+          <a:noFill/>
+          <a:ln w="12700">
+            <a:solidFill>
+              <a:prstClr val="black"/>
+            </a:solidFill>
+          </a:ln>
+        </p:spPr>
+        <p:txBody>
+          <a:bodyPr vert="horz" lIns="91440" tIns="45720" rIns="91440" bIns="45720" rtlCol="0" anchor="ctr"/>
+          <a:lstStyle/>
+          <a:p>
+            <a:endParaRPr lang="en-US"/>
+          </a:p>
+        </p:txBody>
+      </p:sp>
+      <p:sp>
+        <p:nvSpPr>
+          <p:cNvPr id="5" name="Notes Placeholder 4"/>
+          <p:cNvSpPr>
+            <a:spLocks noGrp="1"/>
+          </p:cNvSpPr>
+          <p:nvPr>
+            <p:ph type="body" sz="quarter" idx="3"/>
+          </p:nvPr>
+        </p:nvSpPr>
+        <p:spPr>
+          <a:xfrm>
+            <a:off x="685800" y="4400550"/>
+            <a:ext cx="5486400" cy="3600450"/>
+          </a:xfrm>
+          <a:prstGeom prst="rect">
+            <a:avLst/>
+          </a:prstGeom>
+        </p:spPr>
+        <p:txBody>
+          <a:bodyPr vert="horz" lIns="91440" tIns="45720" rIns="91440" bIns="45720" rtlCol="0"/>
+          <a:lstStyle/>
+          <a:p>
+            <a:pPr lvl="0"/>
+            <a:r>
+              <a:rPr lang="en-US"/>
+              <a:t>Edit Master text styles</a:t>
+            </a:r>
+          </a:p>
+          <a:p>
+            <a:pPr lvl="1"/>
+            <a:r>
+              <a:rPr lang="en-US"/>
+              <a:t>Second level</a:t>
+            </a:r>
+          </a:p>
+          <a:p>
+            <a:pPr lvl="2"/>
+            <a:r>
+              <a:rPr lang="en-US"/>
+              <a:t>Third level</a:t>
+            </a:r>
+          </a:p>
+          <a:p>
+            <a:pPr lvl="3"/>
+            <a:r>
+              <a:rPr lang="en-US"/>
+              <a:t>Fourth level</a:t>
+            </a:r>
+          </a:p>
+          <a:p>
+            <a:pPr lvl="4"/>
+            <a:r>
+              <a:rPr lang="en-US"/>
+              <a:t>Fifth level</a:t>
+            </a:r>
+          </a:p>
+        </p:txBody>
+      </p:sp>
+      <p:sp>
+        <p:nvSpPr>
+          <p:cNvPr id="6" name="Footer Placeholder 5"/>
+          <p:cNvSpPr>
+            <a:spLocks noGrp="1"/>
+          </p:cNvSpPr>
+          <p:nvPr>
+            <p:ph type="ftr" sz="quarter" idx="4"/>
+          </p:nvPr>
+        </p:nvSpPr>
+        <p:spPr>
+          <a:xfrm>
+            <a:off x="0" y="8685213"/>
+            <a:ext cx="2971800" cy="458787"/>
+          </a:xfrm>
+          <a:prstGeom prst="rect">
+            <a:avLst/>
+          </a:prstGeom>
+        </p:spPr>
+        <p:txBody>
+          <a:bodyPr vert="horz" lIns="91440" tIns="45720" rIns="91440" bIns="45720" rtlCol="0" anchor="b"/>
+          <a:lstStyle>
+            <a:lvl1pPr algn="l">
+              <a:defRPr sz="1200"/>
+            </a:lvl1pPr>
+          </a:lstStyle>
+          <a:p>
+            <a:endParaRPr lang="en-US"/>
+          </a:p>
+        </p:txBody>
+      </p:sp>
+      <p:sp>
+        <p:nvSpPr>
+          <p:cNvPr id="7" name="Slide Number Placeholder 6"/>
+          <p:cNvSpPr>
+            <a:spLocks noGrp="1"/>
+          </p:cNvSpPr>
+          <p:nvPr>
+            <p:ph type="sldNum" sz="quarter" idx="5"/>
+          </p:nvPr>
+        </p:nvSpPr>
+        <p:spPr>
+          <a:xfrm>
+            <a:off x="3884613" y="8685213"/>
+            <a:ext cx="2971800" cy="458787"/>
+          </a:xfrm>
+          <a:prstGeom prst="rect">
+            <a:avLst/>
+          </a:prstGeom>
+        </p:spPr>
+        <p:txBody>
+          <a:bodyPr vert="horz" lIns="91440" tIns="45720" rIns="91440" bIns="45720" rtlCol="0" anchor="b"/>
+          <a:lstStyle>
+            <a:lvl1pPr algn="r">
+              <a:defRPr sz="1200"/>
+            </a:lvl1pPr>
+          </a:lstStyle>
+          <a:p>
+            <a:fld id="{E9185550-079B-524C-BD84-369302E012EC}" type="slidenum">
+              <a:rPr lang="en-US" smtClean="0"/>
+              <a:t>‹#›</a:t>
+            </a:fld>
+            <a:endParaRPr lang="en-US"/>
+          </a:p>
+        </p:txBody>
+      </p:sp>
+    </p:spTree>
+    <p:extLst>
+      <p:ext uri="{BB962C8B-B14F-4D97-AF65-F5344CB8AC3E}">
+        <p14:creationId xmlns:p14="http://schemas.microsoft.com/office/powerpoint/2010/main" val="1951607559"/>
+      </p:ext>
+    </p:extLst>
+  </p:cSld>
+  <p:clrMap bg1="lt1" tx1="dk1" bg2="lt2" tx2="dk2" accent1="accent1" accent2="accent2" accent3="accent3" accent4="accent4" accent5="accent5" accent6="accent6" hlink="hlink" folHlink="folHlink"/>
+  <p:notesStyle>
+    <a:lvl1pPr marL="0" algn="l" defTabSz="914400" rtl="0" eaLnBrk="1" latinLnBrk="0" hangingPunct="1">
+      <a:defRPr sz="1200" kern="1200">
+        <a:solidFill>
+          <a:schemeClr val="tx1"/>
+        </a:solidFill>
+        <a:latin typeface="+mn-lt"/>
+        <a:ea typeface="+mn-ea"/>
+        <a:cs typeface="+mn-cs"/>
+      </a:defRPr>
+    </a:lvl1pPr>
+    <a:lvl2pPr marL="457200" algn="l" defTabSz="914400" rtl="0" eaLnBrk="1" latinLnBrk="0" hangingPunct="1">
+      <a:defRPr sz="1200" kern="1200">
+        <a:solidFill>
+          <a:schemeClr val="tx1"/>
+        </a:solidFill>
+        <a:latin typeface="+mn-lt"/>
+        <a:ea typeface="+mn-ea"/>
+        <a:cs typeface="+mn-cs"/>
+      </a:defRPr>
+    </a:lvl2pPr>
+    <a:lvl3pPr marL="914400" algn="l" defTabSz="914400" rtl="0" eaLnBrk="1" latinLnBrk="0" hangingPunct="1">
+      <a:defRPr sz="1200" kern="1200">
+        <a:solidFill>
+          <a:schemeClr val="tx1"/>
+        </a:solidFill>
+        <a:latin typeface="+mn-lt"/>
+        <a:ea typeface="+mn-ea"/>
+        <a:cs typeface="+mn-cs"/>
+      </a:defRPr>
+    </a:lvl3pPr>
+    <a:lvl4pPr marL="1371600" algn="l" defTabSz="914400" rtl="0" eaLnBrk="1" latinLnBrk="0" hangingPunct="1">
+      <a:defRPr sz="1200" kern="1200">
+        <a:solidFill>
+          <a:schemeClr val="tx1"/>
+        </a:solidFill>
+        <a:latin typeface="+mn-lt"/>
+        <a:ea typeface="+mn-ea"/>
+        <a:cs typeface="+mn-cs"/>
+      </a:defRPr>
+    </a:lvl4pPr>
+    <a:lvl5pPr marL="1828800" algn="l" defTabSz="914400" rtl="0" eaLnBrk="1" latinLnBrk="0" hangingPunct="1">
+      <a:defRPr sz="1200" kern="1200">
+        <a:solidFill>
+          <a:schemeClr val="tx1"/>
+        </a:solidFill>
+        <a:latin typeface="+mn-lt"/>
+        <a:ea typeface="+mn-ea"/>
+        <a:cs typeface="+mn-cs"/>
+      </a:defRPr>
+    </a:lvl5pPr>
+    <a:lvl6pPr marL="2286000" algn="l" defTabSz="914400" rtl="0" eaLnBrk="1" latinLnBrk="0" hangingPunct="1">
+      <a:defRPr sz="1200" kern="1200">
+        <a:solidFill>
+          <a:schemeClr val="tx1"/>
+        </a:solidFill>
+        <a:latin typeface="+mn-lt"/>
+        <a:ea typeface="+mn-ea"/>
+        <a:cs typeface="+mn-cs"/>
+      </a:defRPr>
+    </a:lvl6pPr>
+    <a:lvl7pPr marL="2743200" algn="l" defTabSz="914400" rtl="0" eaLnBrk="1" latinLnBrk="0" hangingPunct="1">
+      <a:defRPr sz="1200" kern="1200">
+        <a:solidFill>
+          <a:schemeClr val="tx1"/>
+        </a:solidFill>
+        <a:latin typeface="+mn-lt"/>
+        <a:ea typeface="+mn-ea"/>
+        <a:cs typeface="+mn-cs"/>
+      </a:defRPr>
+    </a:lvl7pPr>
+    <a:lvl8pPr marL="3200400" algn="l" defTabSz="914400" rtl="0" eaLnBrk="1" latinLnBrk="0" hangingPunct="1">
+      <a:defRPr sz="1200" kern="1200">
+        <a:solidFill>
+          <a:schemeClr val="tx1"/>
+        </a:solidFill>
+        <a:latin typeface="+mn-lt"/>
+        <a:ea typeface="+mn-ea"/>
+        <a:cs typeface="+mn-cs"/>
+      </a:defRPr>
+    </a:lvl8pPr>
+    <a:lvl9pPr marL="3657600" algn="l" defTabSz="914400" rtl="0" eaLnBrk="1" latinLnBrk="0" hangingPunct="1">
+      <a:defRPr sz="1200" kern="1200">
+        <a:solidFill>
+          <a:schemeClr val="tx1"/>
+        </a:solidFill>
+        <a:latin typeface="+mn-lt"/>
+        <a:ea typeface="+mn-ea"/>
+        <a:cs typeface="+mn-cs"/>
+      </a:defRPr>
+    </a:lvl9pPr>
+  </p:notesStyle>
+</p:notesMaster>
+</file>
+
+<file path=ppt/notesSlides/notesSlide1.xml><?xml version="1.0" encoding="utf-8"?>
+<p:notes xmlns:a="http://schemas.openxmlformats.org/drawingml/2006/main" xmlns:r="http://schemas.openxmlformats.org/officeDocument/2006/relationships" xmlns:p="http://schemas.openxmlformats.org/presentationml/2006/main" showMasterSp="0" showMasterPhAnim="0">
+  <p:cSld>
+    <p:spTree>
+      <p:nvGrpSpPr>
+        <p:cNvPr id="1" name="Shape 304"/>
+        <p:cNvGrpSpPr/>
+        <p:nvPr/>
+      </p:nvGrpSpPr>
+      <p:grpSpPr>
+        <a:xfrm>
+          <a:off x="0" y="0"/>
+          <a:ext cx="0" cy="0"/>
+          <a:chOff x="0" y="0"/>
+          <a:chExt cx="0" cy="0"/>
+        </a:xfrm>
+      </p:grpSpPr>
+      <p:sp>
+        <p:nvSpPr>
+          <p:cNvPr id="305" name="Google Shape;305;g5b0cd4a30e_0_0:notes"/>
+          <p:cNvSpPr txBox="1">
+            <a:spLocks noGrp="1"/>
+          </p:cNvSpPr>
+          <p:nvPr>
+            <p:ph type="body" idx="1"/>
+          </p:nvPr>
+        </p:nvSpPr>
+        <p:spPr>
+          <a:xfrm>
+            <a:off x="685800" y="4400550"/>
+            <a:ext cx="5486400" cy="3600600"/>
+          </a:xfrm>
+          <a:prstGeom prst="rect">
+            <a:avLst/>
+          </a:prstGeom>
+        </p:spPr>
+        <p:txBody>
+          <a:bodyPr spcFirstLastPara="1" wrap="square" lIns="91425" tIns="91425" rIns="91425" bIns="91425" anchor="t" anchorCtr="0">
+            <a:noAutofit/>
+          </a:bodyPr>
+          <a:lstStyle/>
+          <a:p>
+            <a:pPr marL="0" lvl="0" indent="0" algn="l" rtl="0">
+              <a:spcBef>
+                <a:spcPts val="0"/>
+              </a:spcBef>
+              <a:spcAft>
+                <a:spcPts val="0"/>
+              </a:spcAft>
+              <a:buNone/>
+            </a:pPr>
+            <a:endParaRPr/>
+          </a:p>
+        </p:txBody>
+      </p:sp>
+      <p:sp>
+        <p:nvSpPr>
+          <p:cNvPr id="306" name="Google Shape;306;g5b0cd4a30e_0_0:notes"/>
+          <p:cNvSpPr>
+            <a:spLocks noGrp="1" noRot="1" noChangeAspect="1"/>
+          </p:cNvSpPr>
+          <p:nvPr>
+            <p:ph type="sldImg" idx="2"/>
+          </p:nvPr>
+        </p:nvSpPr>
+        <p:spPr>
+          <a:xfrm>
+            <a:off x="685800" y="1143000"/>
+            <a:ext cx="5486400" cy="3086100"/>
+          </a:xfrm>
+          <a:custGeom>
+            <a:avLst/>
+            <a:gdLst/>
+            <a:ahLst/>
+            <a:cxnLst/>
+            <a:rect l="l" t="t" r="r" b="b"/>
+            <a:pathLst>
+              <a:path w="120000" h="120000" extrusionOk="0">
+                <a:moveTo>
+                  <a:pt x="0" y="0"/>
+                </a:moveTo>
+                <a:lnTo>
+                  <a:pt x="120000" y="0"/>
+                </a:lnTo>
+                <a:lnTo>
+                  <a:pt x="120000" y="120000"/>
+                </a:lnTo>
+                <a:lnTo>
+                  <a:pt x="0" y="120000"/>
+                </a:lnTo>
+                <a:close/>
+              </a:path>
+            </a:pathLst>
+          </a:custGeom>
+        </p:spPr>
+      </p:sp>
+    </p:spTree>
+    <p:extLst>
+      <p:ext uri="{BB962C8B-B14F-4D97-AF65-F5344CB8AC3E}">
+        <p14:creationId xmlns:p14="http://schemas.microsoft.com/office/powerpoint/2010/main" val="2804974017"/>
+      </p:ext>
+    </p:extLst>
+  </p:cSld>
+  <p:clrMapOvr>
+    <a:masterClrMapping/>
+  </p:clrMapOvr>
+</p:notes>
 </file>
 
 <file path=ppt/slideLayouts/slideLayout1.xml><?xml version="1.0" encoding="utf-8"?>
@@ -3324,6 +3786,1417 @@
   <p:cSld>
     <p:spTree>
       <p:nvGrpSpPr>
+        <p:cNvPr id="1" name="Shape 307"/>
+        <p:cNvGrpSpPr/>
+        <p:nvPr/>
+      </p:nvGrpSpPr>
+      <p:grpSpPr>
+        <a:xfrm>
+          <a:off x="0" y="0"/>
+          <a:ext cx="0" cy="0"/>
+          <a:chOff x="0" y="0"/>
+          <a:chExt cx="0" cy="0"/>
+        </a:xfrm>
+      </p:grpSpPr>
+      <p:sp>
+        <p:nvSpPr>
+          <p:cNvPr id="5" name="Content Placeholder 4">
+            <a:extLst>
+              <a:ext uri="{FF2B5EF4-FFF2-40B4-BE49-F238E27FC236}">
+                <a16:creationId xmlns:a16="http://schemas.microsoft.com/office/drawing/2014/main" id="{C2739284-A397-754C-8DA3-4C2094F453C5}"/>
+              </a:ext>
+            </a:extLst>
+          </p:cNvPr>
+          <p:cNvSpPr>
+            <a:spLocks noGrp="1"/>
+          </p:cNvSpPr>
+          <p:nvPr>
+            <p:ph sz="half" idx="2"/>
+          </p:nvPr>
+        </p:nvSpPr>
+        <p:spPr>
+          <a:xfrm>
+            <a:off x="6172200" y="286871"/>
+            <a:ext cx="5181600" cy="6131858"/>
+          </a:xfrm>
+        </p:spPr>
+        <p:txBody>
+          <a:bodyPr>
+            <a:normAutofit/>
+          </a:bodyPr>
+          <a:lstStyle/>
+          <a:p>
+            <a:pPr>
+              <a:buFont typeface="+mj-lt"/>
+              <a:buAutoNum type="arabicPeriod"/>
+            </a:pPr>
+            <a:r>
+              <a:rPr lang="en-US" sz="1200" dirty="0">
+                <a:hlinkClick r:id="rId3"/>
+              </a:rPr>
+              <a:t>https://github.com/join</a:t>
+            </a:r>
+            <a:endParaRPr lang="en-US" sz="1200" dirty="0"/>
+          </a:p>
+          <a:p>
+            <a:pPr>
+              <a:buFont typeface="+mj-lt"/>
+              <a:buAutoNum type="arabicPeriod"/>
+            </a:pPr>
+            <a:r>
+              <a:rPr lang="en-US" sz="1200" dirty="0"/>
+              <a:t>Go to </a:t>
+            </a:r>
+            <a:r>
+              <a:rPr lang="en-US" sz="1200" dirty="0">
+                <a:hlinkClick r:id="rId4"/>
+              </a:rPr>
+              <a:t>https://github.com/CoderDojoTC/ai-racing-league</a:t>
+            </a:r>
+            <a:r>
+              <a:rPr lang="en-US" sz="1200" dirty="0"/>
+              <a:t>, click on “fork”</a:t>
+            </a:r>
+          </a:p>
+          <a:p>
+            <a:pPr>
+              <a:buFont typeface="+mj-lt"/>
+              <a:buAutoNum type="arabicPeriod"/>
+            </a:pPr>
+            <a:r>
+              <a:rPr lang="en-US" sz="1200" dirty="0"/>
+              <a:t>Go to </a:t>
+            </a:r>
+            <a:r>
+              <a:rPr lang="en-US" sz="1200" dirty="0">
+                <a:hlinkClick r:id="rId4"/>
+              </a:rPr>
+              <a:t>https://github.com/CoderDojoTC/ai-racing-league</a:t>
+            </a:r>
+            <a:r>
+              <a:rPr lang="en-US" sz="1200" dirty="0"/>
+              <a:t>, click on “issues”, then “New issue”</a:t>
+            </a:r>
+          </a:p>
+          <a:p>
+            <a:pPr>
+              <a:buFont typeface="+mj-lt"/>
+              <a:buAutoNum type="arabicPeriod"/>
+            </a:pPr>
+            <a:r>
+              <a:rPr lang="en-US" sz="1200" dirty="0"/>
+              <a:t>Go to your forked project, e.g. </a:t>
+            </a:r>
+            <a:r>
+              <a:rPr lang="en-US" sz="1200" dirty="0">
+                <a:hlinkClick r:id="rId5"/>
+              </a:rPr>
+              <a:t>https://github.com/johngchen/ai-racing-league</a:t>
+            </a:r>
+            <a:r>
+              <a:rPr lang="en-US" sz="1200" dirty="0"/>
+              <a:t>, click the file you want to edit, click the pen icon        ,  make changes, then “Commit changes”</a:t>
+            </a:r>
+          </a:p>
+          <a:p>
+            <a:pPr>
+              <a:buFont typeface="+mj-lt"/>
+              <a:buAutoNum type="arabicPeriod"/>
+            </a:pPr>
+            <a:r>
+              <a:rPr lang="en-US" sz="1200" dirty="0"/>
+              <a:t> Go to your forked project, click on “New pull </a:t>
+            </a:r>
+            <a:r>
+              <a:rPr lang="en-US" sz="1200"/>
+              <a:t>request” </a:t>
+            </a:r>
+            <a:endParaRPr lang="en-US" sz="1200" dirty="0"/>
+          </a:p>
+          <a:p>
+            <a:pPr>
+              <a:buFont typeface="+mj-lt"/>
+              <a:buAutoNum type="arabicPeriod"/>
+            </a:pPr>
+            <a:r>
+              <a:rPr lang="en-US" sz="1200" dirty="0"/>
+              <a:t>Mac: already installed, type git --version to verify; Windows: </a:t>
+            </a:r>
+            <a:r>
+              <a:rPr lang="en-US" sz="1200" dirty="0">
+                <a:hlinkClick r:id="rId6"/>
+              </a:rPr>
+              <a:t>https://git-scm.com/download/win</a:t>
+            </a:r>
+            <a:endParaRPr lang="en-US" sz="1200" dirty="0"/>
+          </a:p>
+          <a:p>
+            <a:pPr>
+              <a:buFont typeface="+mj-lt"/>
+              <a:buAutoNum type="arabicPeriod"/>
+            </a:pPr>
+            <a:r>
+              <a:rPr lang="en-US" sz="1000" dirty="0">
+                <a:latin typeface="Courier New" panose="02070309020205020404" pitchFamily="49" charset="0"/>
+                <a:cs typeface="Courier New" panose="02070309020205020404" pitchFamily="49" charset="0"/>
+              </a:rPr>
+              <a:t>$ </a:t>
+            </a:r>
+            <a:r>
+              <a:rPr lang="en-US" sz="1000" b="1" dirty="0">
+                <a:latin typeface="Courier New" panose="02070309020205020404" pitchFamily="49" charset="0"/>
+                <a:cs typeface="Courier New" panose="02070309020205020404" pitchFamily="49" charset="0"/>
+              </a:rPr>
+              <a:t>git clone </a:t>
+            </a:r>
+            <a:r>
+              <a:rPr lang="en-US" sz="1000" dirty="0">
+                <a:latin typeface="Courier New" panose="02070309020205020404" pitchFamily="49" charset="0"/>
+                <a:cs typeface="Courier New" panose="02070309020205020404" pitchFamily="49" charset="0"/>
+                <a:hlinkClick r:id="rId7"/>
+              </a:rPr>
+              <a:t>https://github.com/johngchen/ai-racing-league.git</a:t>
+            </a:r>
+            <a:endParaRPr lang="en-US" sz="1000" dirty="0">
+              <a:latin typeface="Courier New" panose="02070309020205020404" pitchFamily="49" charset="0"/>
+              <a:cs typeface="Courier New" panose="02070309020205020404" pitchFamily="49" charset="0"/>
+            </a:endParaRPr>
+          </a:p>
+          <a:p>
+            <a:r>
+              <a:rPr lang="en-US" sz="1000" dirty="0">
+                <a:latin typeface="Courier New" panose="02070309020205020404" pitchFamily="49" charset="0"/>
+                <a:cs typeface="Courier New" panose="02070309020205020404" pitchFamily="49" charset="0"/>
+              </a:rPr>
+              <a:t>$ </a:t>
+            </a:r>
+            <a:r>
+              <a:rPr lang="en-US" sz="1000" b="1" dirty="0">
+                <a:latin typeface="Courier New" panose="02070309020205020404" pitchFamily="49" charset="0"/>
+                <a:cs typeface="Courier New" panose="02070309020205020404" pitchFamily="49" charset="0"/>
+              </a:rPr>
+              <a:t>cd </a:t>
+            </a:r>
+            <a:r>
+              <a:rPr lang="en-US" sz="1000" b="1" dirty="0" err="1">
+                <a:latin typeface="Courier New" panose="02070309020205020404" pitchFamily="49" charset="0"/>
+                <a:cs typeface="Courier New" panose="02070309020205020404" pitchFamily="49" charset="0"/>
+              </a:rPr>
+              <a:t>ai</a:t>
+            </a:r>
+            <a:r>
+              <a:rPr lang="en-US" sz="1000" b="1" dirty="0">
+                <a:latin typeface="Courier New" panose="02070309020205020404" pitchFamily="49" charset="0"/>
+                <a:cs typeface="Courier New" panose="02070309020205020404" pitchFamily="49" charset="0"/>
+              </a:rPr>
+              <a:t>-racing-league/</a:t>
+            </a:r>
+          </a:p>
+          <a:p>
+            <a:r>
+              <a:rPr lang="en-US" sz="1000" dirty="0">
+                <a:latin typeface="Courier New" panose="02070309020205020404" pitchFamily="49" charset="0"/>
+                <a:cs typeface="Courier New" panose="02070309020205020404" pitchFamily="49" charset="0"/>
+              </a:rPr>
+              <a:t>$ </a:t>
+            </a:r>
+            <a:r>
+              <a:rPr lang="en-US" sz="1000" b="1" dirty="0">
+                <a:latin typeface="Courier New" panose="02070309020205020404" pitchFamily="49" charset="0"/>
+                <a:cs typeface="Courier New" panose="02070309020205020404" pitchFamily="49" charset="0"/>
+              </a:rPr>
+              <a:t>touch </a:t>
+            </a:r>
+            <a:r>
+              <a:rPr lang="en-US" sz="1000" b="1" dirty="0" err="1">
+                <a:latin typeface="Courier New" panose="02070309020205020404" pitchFamily="49" charset="0"/>
+                <a:cs typeface="Courier New" panose="02070309020205020404" pitchFamily="49" charset="0"/>
+              </a:rPr>
+              <a:t>myDemo.txt</a:t>
+            </a:r>
+            <a:endParaRPr lang="en-US" sz="1000" b="1" dirty="0">
+              <a:latin typeface="Courier New" panose="02070309020205020404" pitchFamily="49" charset="0"/>
+              <a:cs typeface="Courier New" panose="02070309020205020404" pitchFamily="49" charset="0"/>
+            </a:endParaRPr>
+          </a:p>
+          <a:p>
+            <a:r>
+              <a:rPr lang="en-US" sz="1000" dirty="0">
+                <a:latin typeface="Courier New" panose="02070309020205020404" pitchFamily="49" charset="0"/>
+                <a:cs typeface="Courier New" panose="02070309020205020404" pitchFamily="49" charset="0"/>
+              </a:rPr>
+              <a:t>$ </a:t>
+            </a:r>
+            <a:r>
+              <a:rPr lang="en-US" sz="1000" b="1" dirty="0">
+                <a:latin typeface="Courier New" panose="02070309020205020404" pitchFamily="49" charset="0"/>
+                <a:cs typeface="Courier New" panose="02070309020205020404" pitchFamily="49" charset="0"/>
+              </a:rPr>
+              <a:t>git status</a:t>
+            </a:r>
+          </a:p>
+          <a:p>
+            <a:r>
+              <a:rPr lang="en-US" sz="1000" dirty="0">
+                <a:latin typeface="Courier New" panose="02070309020205020404" pitchFamily="49" charset="0"/>
+                <a:cs typeface="Courier New" panose="02070309020205020404" pitchFamily="49" charset="0"/>
+              </a:rPr>
+              <a:t>$ </a:t>
+            </a:r>
+            <a:r>
+              <a:rPr lang="en-US" sz="1000" b="1" dirty="0">
+                <a:latin typeface="Courier New" panose="02070309020205020404" pitchFamily="49" charset="0"/>
+                <a:cs typeface="Courier New" panose="02070309020205020404" pitchFamily="49" charset="0"/>
+              </a:rPr>
+              <a:t>git add .</a:t>
+            </a:r>
+          </a:p>
+          <a:p>
+            <a:r>
+              <a:rPr lang="en-US" sz="1000" dirty="0">
+                <a:latin typeface="Courier New" panose="02070309020205020404" pitchFamily="49" charset="0"/>
+                <a:cs typeface="Courier New" panose="02070309020205020404" pitchFamily="49" charset="0"/>
+              </a:rPr>
+              <a:t>$ </a:t>
+            </a:r>
+            <a:r>
+              <a:rPr lang="en-US" sz="1000" b="1" dirty="0">
+                <a:latin typeface="Courier New" panose="02070309020205020404" pitchFamily="49" charset="0"/>
+                <a:cs typeface="Courier New" panose="02070309020205020404" pitchFamily="49" charset="0"/>
+              </a:rPr>
+              <a:t>git commit -m "just a demo”</a:t>
+            </a:r>
+          </a:p>
+          <a:p>
+            <a:r>
+              <a:rPr lang="en-US" sz="1000" dirty="0">
+                <a:latin typeface="Courier New" panose="02070309020205020404" pitchFamily="49" charset="0"/>
+                <a:cs typeface="Courier New" panose="02070309020205020404" pitchFamily="49" charset="0"/>
+              </a:rPr>
+              <a:t>$ </a:t>
+            </a:r>
+            <a:r>
+              <a:rPr lang="en-US" sz="1000" b="1" dirty="0">
+                <a:latin typeface="Courier New" panose="02070309020205020404" pitchFamily="49" charset="0"/>
+                <a:cs typeface="Courier New" panose="02070309020205020404" pitchFamily="49" charset="0"/>
+              </a:rPr>
+              <a:t>git push</a:t>
+            </a:r>
+          </a:p>
+          <a:p>
+            <a:pPr>
+              <a:buFont typeface="+mj-lt"/>
+              <a:buAutoNum type="arabicPeriod"/>
+            </a:pPr>
+            <a:endParaRPr lang="en-US" sz="1200" dirty="0"/>
+          </a:p>
+          <a:p>
+            <a:pPr marL="0" indent="0">
+              <a:buNone/>
+            </a:pPr>
+            <a:r>
+              <a:rPr lang="en-US" sz="1200" b="1" dirty="0"/>
+              <a:t>Useful info:</a:t>
+            </a:r>
+          </a:p>
+          <a:p>
+            <a:r>
+              <a:rPr lang="en-US" sz="1200" dirty="0">
+                <a:hlinkClick r:id="rId8"/>
+              </a:rPr>
+              <a:t>https://gist.github.com/arttuladhar/5887559</a:t>
+            </a:r>
+            <a:endParaRPr lang="en-US" sz="1200" dirty="0"/>
+          </a:p>
+          <a:p>
+            <a:r>
+              <a:rPr lang="en-US" sz="1200" dirty="0">
+                <a:hlinkClick r:id="rId9"/>
+              </a:rPr>
+              <a:t>https://gist.github.com/jedmao/5053440</a:t>
+            </a:r>
+            <a:endParaRPr lang="en-US" sz="1200" dirty="0"/>
+          </a:p>
+          <a:p>
+            <a:r>
+              <a:rPr lang="en-US" sz="1200" dirty="0">
+                <a:hlinkClick r:id="rId10"/>
+              </a:rPr>
+              <a:t>https://git-scm.com/docs</a:t>
+            </a:r>
+            <a:endParaRPr lang="en-US" sz="1200" dirty="0"/>
+          </a:p>
+          <a:p>
+            <a:r>
+              <a:rPr lang="en-US" sz="1200" dirty="0">
+                <a:hlinkClick r:id="rId11"/>
+              </a:rPr>
+              <a:t>https://www.atlassian.com/git/tutorials</a:t>
+            </a:r>
+            <a:endParaRPr lang="en-US" sz="1200" dirty="0"/>
+          </a:p>
+          <a:p>
+            <a:pPr>
+              <a:buFont typeface="+mj-lt"/>
+              <a:buAutoNum type="arabicPeriod"/>
+            </a:pPr>
+            <a:endParaRPr lang="en-US" sz="1200" dirty="0"/>
+          </a:p>
+        </p:txBody>
+      </p:sp>
+      <p:sp>
+        <p:nvSpPr>
+          <p:cNvPr id="9" name="Content Placeholder 8">
+            <a:extLst>
+              <a:ext uri="{FF2B5EF4-FFF2-40B4-BE49-F238E27FC236}">
+                <a16:creationId xmlns:a16="http://schemas.microsoft.com/office/drawing/2014/main" id="{61299850-5E20-B544-AD43-97A13093377D}"/>
+              </a:ext>
+            </a:extLst>
+          </p:cNvPr>
+          <p:cNvSpPr>
+            <a:spLocks noGrp="1"/>
+          </p:cNvSpPr>
+          <p:nvPr>
+            <p:ph sz="half" idx="1"/>
+          </p:nvPr>
+        </p:nvSpPr>
+        <p:spPr>
+          <a:xfrm>
+            <a:off x="838200" y="286871"/>
+            <a:ext cx="5181600" cy="5890092"/>
+          </a:xfrm>
+        </p:spPr>
+        <p:txBody>
+          <a:bodyPr/>
+          <a:lstStyle/>
+          <a:p>
+            <a:pPr marL="0" indent="0" algn="ctr">
+              <a:buNone/>
+            </a:pPr>
+            <a:r>
+              <a:rPr lang="en-US" dirty="0"/>
+              <a:t>Git and GitHub</a:t>
+            </a:r>
+          </a:p>
+          <a:p>
+            <a:pPr marL="0" indent="0">
+              <a:buNone/>
+            </a:pPr>
+            <a:endParaRPr lang="en-US" dirty="0"/>
+          </a:p>
+          <a:p>
+            <a:pPr marL="0" indent="0">
+              <a:buNone/>
+            </a:pPr>
+            <a:endParaRPr lang="en-US" dirty="0"/>
+          </a:p>
+          <a:p>
+            <a:pPr marL="0" indent="0">
+              <a:buNone/>
+            </a:pPr>
+            <a:r>
+              <a:rPr lang="en-US" sz="1200" b="1" dirty="0"/>
+              <a:t>Activity: </a:t>
+            </a:r>
+          </a:p>
+          <a:p>
+            <a:pPr marL="0" indent="0">
+              <a:buNone/>
+            </a:pPr>
+            <a:r>
+              <a:rPr lang="en-US" sz="1200" dirty="0"/>
+              <a:t>Join </a:t>
+            </a:r>
+            <a:r>
+              <a:rPr lang="en-US" sz="1200" dirty="0" err="1"/>
+              <a:t>GitHub.com</a:t>
+            </a:r>
+            <a:r>
+              <a:rPr lang="en-US" sz="1200" dirty="0"/>
+              <a:t>; Fork the original project; Clone it to your own PC; Hack the code and have fun</a:t>
+            </a:r>
+          </a:p>
+          <a:p>
+            <a:pPr marL="0" indent="0">
+              <a:buNone/>
+            </a:pPr>
+            <a:endParaRPr lang="en-US" sz="1200" dirty="0"/>
+          </a:p>
+          <a:p>
+            <a:pPr marL="0" indent="0">
+              <a:buNone/>
+            </a:pPr>
+            <a:r>
+              <a:rPr lang="en-US" sz="1200" b="1" dirty="0"/>
+              <a:t>Questions:</a:t>
+            </a:r>
+          </a:p>
+          <a:p>
+            <a:pPr marL="514350" indent="-514350">
+              <a:buFont typeface="+mj-lt"/>
+              <a:buAutoNum type="arabicPeriod"/>
+            </a:pPr>
+            <a:r>
+              <a:rPr lang="en-US" sz="1200" dirty="0"/>
+              <a:t>How to join </a:t>
+            </a:r>
+            <a:r>
+              <a:rPr lang="en-US" sz="1200" dirty="0" err="1"/>
+              <a:t>GitHub.com</a:t>
+            </a:r>
+            <a:endParaRPr lang="en-US" sz="1200" dirty="0"/>
+          </a:p>
+          <a:p>
+            <a:pPr marL="514350" indent="-514350">
+              <a:buFont typeface="+mj-lt"/>
+              <a:buAutoNum type="arabicPeriod"/>
+            </a:pPr>
+            <a:r>
+              <a:rPr lang="en-US" sz="1200" dirty="0"/>
+              <a:t>How to fork a repository</a:t>
+            </a:r>
+          </a:p>
+          <a:p>
+            <a:pPr marL="514350" indent="-514350">
+              <a:buFont typeface="+mj-lt"/>
+              <a:buAutoNum type="arabicPeriod"/>
+            </a:pPr>
+            <a:r>
+              <a:rPr lang="en-US" sz="1200" dirty="0"/>
+              <a:t>How to raise a new issue</a:t>
+            </a:r>
+          </a:p>
+          <a:p>
+            <a:pPr marL="514350" indent="-514350">
+              <a:buFont typeface="+mj-lt"/>
+              <a:buAutoNum type="arabicPeriod"/>
+            </a:pPr>
+            <a:r>
+              <a:rPr lang="en-US" sz="1200" dirty="0"/>
+              <a:t>How to make some quick and dirty changes on GitHub</a:t>
+            </a:r>
+          </a:p>
+          <a:p>
+            <a:pPr marL="514350" indent="-514350">
+              <a:buFont typeface="+mj-lt"/>
+              <a:buAutoNum type="arabicPeriod"/>
+            </a:pPr>
+            <a:r>
+              <a:rPr lang="en-US" sz="1200" dirty="0"/>
+              <a:t>How to contribute back to the project</a:t>
+            </a:r>
+          </a:p>
+          <a:p>
+            <a:pPr marL="514350" indent="-514350">
+              <a:buFont typeface="+mj-lt"/>
+              <a:buAutoNum type="arabicPeriod"/>
+            </a:pPr>
+            <a:r>
+              <a:rPr lang="en-US" sz="1200" dirty="0"/>
+              <a:t>How to install git on your PC</a:t>
+            </a:r>
+          </a:p>
+          <a:p>
+            <a:pPr marL="514350" indent="-514350">
+              <a:buFont typeface="+mj-lt"/>
+              <a:buAutoNum type="arabicPeriod"/>
+            </a:pPr>
+            <a:r>
+              <a:rPr lang="en-US" sz="1200" dirty="0"/>
+              <a:t>How to make code changes on your PC</a:t>
+            </a:r>
+          </a:p>
+          <a:p>
+            <a:pPr marL="514350" indent="-514350">
+              <a:buFont typeface="+mj-lt"/>
+              <a:buAutoNum type="arabicPeriod"/>
+            </a:pPr>
+            <a:endParaRPr lang="en-US" dirty="0"/>
+          </a:p>
+        </p:txBody>
+      </p:sp>
+      <p:pic>
+        <p:nvPicPr>
+          <p:cNvPr id="10" name="Picture 9">
+            <a:extLst>
+              <a:ext uri="{FF2B5EF4-FFF2-40B4-BE49-F238E27FC236}">
+                <a16:creationId xmlns:a16="http://schemas.microsoft.com/office/drawing/2014/main" id="{95C494E2-1DEB-5C4A-8D3C-9C9ED689C3F8}"/>
+              </a:ext>
+            </a:extLst>
+          </p:cNvPr>
+          <p:cNvPicPr>
+            <a:picLocks noChangeAspect="1"/>
+          </p:cNvPicPr>
+          <p:nvPr/>
+        </p:nvPicPr>
+        <p:blipFill>
+          <a:blip r:embed="rId12"/>
+          <a:stretch>
+            <a:fillRect/>
+          </a:stretch>
+        </p:blipFill>
+        <p:spPr>
+          <a:xfrm>
+            <a:off x="936652" y="779181"/>
+            <a:ext cx="4984696" cy="879288"/>
+          </a:xfrm>
+          <a:prstGeom prst="rect">
+            <a:avLst/>
+          </a:prstGeom>
+        </p:spPr>
+      </p:pic>
+      <p:pic>
+        <p:nvPicPr>
+          <p:cNvPr id="11" name="Picture 10">
+            <a:extLst>
+              <a:ext uri="{FF2B5EF4-FFF2-40B4-BE49-F238E27FC236}">
+                <a16:creationId xmlns:a16="http://schemas.microsoft.com/office/drawing/2014/main" id="{49BAC023-AAFE-A042-9788-5D32397C3039}"/>
+              </a:ext>
+            </a:extLst>
+          </p:cNvPr>
+          <p:cNvPicPr>
+            <a:picLocks noChangeAspect="1"/>
+          </p:cNvPicPr>
+          <p:nvPr/>
+        </p:nvPicPr>
+        <p:blipFill>
+          <a:blip r:embed="rId13"/>
+          <a:stretch>
+            <a:fillRect/>
+          </a:stretch>
+        </p:blipFill>
+        <p:spPr>
+          <a:xfrm>
+            <a:off x="9937003" y="1514828"/>
+            <a:ext cx="211044" cy="232876"/>
+          </a:xfrm>
+          <a:prstGeom prst="rect">
+            <a:avLst/>
+          </a:prstGeom>
+        </p:spPr>
+      </p:pic>
+    </p:spTree>
+    <p:extLst>
+      <p:ext uri="{BB962C8B-B14F-4D97-AF65-F5344CB8AC3E}">
+        <p14:creationId xmlns:p14="http://schemas.microsoft.com/office/powerpoint/2010/main" val="3335744907"/>
+      </p:ext>
+    </p:extLst>
+  </p:cSld>
+  <p:clrMapOvr>
+    <a:masterClrMapping/>
+  </p:clrMapOvr>
+</p:sld>
+</file>
+
+<file path=ppt/slides/slide10.xml><?xml version="1.0" encoding="utf-8"?>
+<p:sld xmlns:a="http://schemas.openxmlformats.org/drawingml/2006/main" xmlns:r="http://schemas.openxmlformats.org/officeDocument/2006/relationships" xmlns:p="http://schemas.openxmlformats.org/presentationml/2006/main">
+  <p:cSld>
+    <p:spTree>
+      <p:nvGrpSpPr>
+        <p:cNvPr id="1" name=""/>
+        <p:cNvGrpSpPr/>
+        <p:nvPr/>
+      </p:nvGrpSpPr>
+      <p:grpSpPr>
+        <a:xfrm>
+          <a:off x="0" y="0"/>
+          <a:ext cx="0" cy="0"/>
+          <a:chOff x="0" y="0"/>
+          <a:chExt cx="0" cy="0"/>
+        </a:xfrm>
+      </p:grpSpPr>
+      <p:sp>
+        <p:nvSpPr>
+          <p:cNvPr id="2" name="Title 1">
+            <a:extLst>
+              <a:ext uri="{FF2B5EF4-FFF2-40B4-BE49-F238E27FC236}">
+                <a16:creationId xmlns:a16="http://schemas.microsoft.com/office/drawing/2014/main" id="{35BE765F-EE8F-3B4A-A714-7D2A1BEDE03C}"/>
+              </a:ext>
+            </a:extLst>
+          </p:cNvPr>
+          <p:cNvSpPr>
+            <a:spLocks noGrp="1"/>
+          </p:cNvSpPr>
+          <p:nvPr>
+            <p:ph type="title"/>
+          </p:nvPr>
+        </p:nvSpPr>
+        <p:spPr/>
+        <p:txBody>
+          <a:bodyPr/>
+          <a:lstStyle/>
+          <a:p>
+            <a:pPr algn="ctr"/>
+            <a:r>
+              <a:rPr lang="en-US" dirty="0"/>
+              <a:t>Git – work on your own computer</a:t>
+            </a:r>
+          </a:p>
+        </p:txBody>
+      </p:sp>
+      <p:sp>
+        <p:nvSpPr>
+          <p:cNvPr id="3" name="Content Placeholder 2">
+            <a:extLst>
+              <a:ext uri="{FF2B5EF4-FFF2-40B4-BE49-F238E27FC236}">
+                <a16:creationId xmlns:a16="http://schemas.microsoft.com/office/drawing/2014/main" id="{4D2CCB5E-5517-CA45-A3DC-E1C1500C22C2}"/>
+              </a:ext>
+            </a:extLst>
+          </p:cNvPr>
+          <p:cNvSpPr>
+            <a:spLocks noGrp="1"/>
+          </p:cNvSpPr>
+          <p:nvPr>
+            <p:ph idx="1"/>
+          </p:nvPr>
+        </p:nvSpPr>
+        <p:spPr/>
+        <p:txBody>
+          <a:bodyPr/>
+          <a:lstStyle/>
+          <a:p>
+            <a:r>
+              <a:rPr lang="en-US" sz="2400" b="1" dirty="0">
+                <a:latin typeface="Courier New" panose="02070309020205020404" pitchFamily="49" charset="0"/>
+                <a:cs typeface="Courier New" panose="02070309020205020404" pitchFamily="49" charset="0"/>
+              </a:rPr>
+              <a:t>git clone</a:t>
+            </a:r>
+            <a:r>
+              <a:rPr lang="en-US" sz="2400" dirty="0"/>
+              <a:t>: make a copy of the source code to your computer</a:t>
+            </a:r>
+          </a:p>
+          <a:p>
+            <a:pPr lvl="1"/>
+            <a:r>
+              <a:rPr lang="en-US" dirty="0"/>
+              <a:t>If you are new to gitHub, just work on the master branch, otherwise</a:t>
+            </a:r>
+          </a:p>
+          <a:p>
+            <a:pPr lvl="1"/>
+            <a:r>
+              <a:rPr lang="en-US" sz="2000" b="1" dirty="0">
+                <a:latin typeface="Courier New" panose="02070309020205020404" pitchFamily="49" charset="0"/>
+                <a:cs typeface="Courier New" panose="02070309020205020404" pitchFamily="49" charset="0"/>
+              </a:rPr>
+              <a:t>git branch</a:t>
+            </a:r>
+            <a:r>
+              <a:rPr lang="en-US" sz="2000" dirty="0"/>
+              <a:t>: make yet another copy of the source code on your computer</a:t>
+            </a:r>
+          </a:p>
+          <a:p>
+            <a:pPr lvl="1"/>
+            <a:r>
+              <a:rPr lang="en-US" sz="2000" b="1" dirty="0">
+                <a:latin typeface="Courier New" panose="02070309020205020404" pitchFamily="49" charset="0"/>
+                <a:cs typeface="Courier New" panose="02070309020205020404" pitchFamily="49" charset="0"/>
+              </a:rPr>
+              <a:t>git checkout</a:t>
+            </a:r>
+            <a:r>
+              <a:rPr lang="en-US" sz="2000" dirty="0"/>
+              <a:t>: switch to the branch to work on it  </a:t>
+            </a:r>
+          </a:p>
+          <a:p>
+            <a:r>
+              <a:rPr lang="en-US" sz="2400" dirty="0"/>
+              <a:t>…. edit your code using vi or your favorite IDE</a:t>
+            </a:r>
+          </a:p>
+          <a:p>
+            <a:r>
+              <a:rPr lang="en-US" sz="2400" b="1" dirty="0">
+                <a:latin typeface="Courier New" panose="02070309020205020404" pitchFamily="49" charset="0"/>
+                <a:cs typeface="Courier New" panose="02070309020205020404" pitchFamily="49" charset="0"/>
+              </a:rPr>
+              <a:t>git add</a:t>
+            </a:r>
+            <a:r>
+              <a:rPr lang="en-US" sz="2400" dirty="0"/>
+              <a:t>: add the changes you make to git to be tracked</a:t>
+            </a:r>
+          </a:p>
+          <a:p>
+            <a:r>
+              <a:rPr lang="en-US" sz="2400" b="1" dirty="0">
+                <a:latin typeface="Courier New" panose="02070309020205020404" pitchFamily="49" charset="0"/>
+                <a:cs typeface="Courier New" panose="02070309020205020404" pitchFamily="49" charset="0"/>
+              </a:rPr>
+              <a:t>git commit</a:t>
+            </a:r>
+            <a:r>
+              <a:rPr lang="en-US" sz="2400" dirty="0"/>
+              <a:t>: commit changes to your local repository</a:t>
+            </a:r>
+          </a:p>
+          <a:p>
+            <a:r>
+              <a:rPr lang="en-US" sz="2400" b="1" dirty="0">
+                <a:latin typeface="Courier New" panose="02070309020205020404" pitchFamily="49" charset="0"/>
+                <a:cs typeface="Courier New" panose="02070309020205020404" pitchFamily="49" charset="0"/>
+              </a:rPr>
+              <a:t>git push</a:t>
+            </a:r>
+            <a:r>
+              <a:rPr lang="en-US" sz="2400" dirty="0"/>
+              <a:t>: push your changes to your </a:t>
+            </a:r>
+            <a:r>
+              <a:rPr lang="en-US" sz="2400" dirty="0" err="1"/>
+              <a:t>github</a:t>
+            </a:r>
+            <a:r>
+              <a:rPr lang="en-US" sz="2400" dirty="0"/>
+              <a:t> fork</a:t>
+            </a:r>
+          </a:p>
+          <a:p>
+            <a:endParaRPr lang="en-US" dirty="0"/>
+          </a:p>
+        </p:txBody>
+      </p:sp>
+    </p:spTree>
+    <p:extLst>
+      <p:ext uri="{BB962C8B-B14F-4D97-AF65-F5344CB8AC3E}">
+        <p14:creationId xmlns:p14="http://schemas.microsoft.com/office/powerpoint/2010/main" val="808685095"/>
+      </p:ext>
+    </p:extLst>
+  </p:cSld>
+  <p:clrMapOvr>
+    <a:masterClrMapping/>
+  </p:clrMapOvr>
+</p:sld>
+</file>
+
+<file path=ppt/slides/slide11.xml><?xml version="1.0" encoding="utf-8"?>
+<p:sld xmlns:a="http://schemas.openxmlformats.org/drawingml/2006/main" xmlns:r="http://schemas.openxmlformats.org/officeDocument/2006/relationships" xmlns:p="http://schemas.openxmlformats.org/presentationml/2006/main">
+  <p:cSld>
+    <p:spTree>
+      <p:nvGrpSpPr>
+        <p:cNvPr id="1" name=""/>
+        <p:cNvGrpSpPr/>
+        <p:nvPr/>
+      </p:nvGrpSpPr>
+      <p:grpSpPr>
+        <a:xfrm>
+          <a:off x="0" y="0"/>
+          <a:ext cx="0" cy="0"/>
+          <a:chOff x="0" y="0"/>
+          <a:chExt cx="0" cy="0"/>
+        </a:xfrm>
+      </p:grpSpPr>
+      <p:sp>
+        <p:nvSpPr>
+          <p:cNvPr id="3" name="Content Placeholder 2">
+            <a:extLst>
+              <a:ext uri="{FF2B5EF4-FFF2-40B4-BE49-F238E27FC236}">
+                <a16:creationId xmlns:a16="http://schemas.microsoft.com/office/drawing/2014/main" id="{4D2CCB5E-5517-CA45-A3DC-E1C1500C22C2}"/>
+              </a:ext>
+            </a:extLst>
+          </p:cNvPr>
+          <p:cNvSpPr>
+            <a:spLocks noGrp="1"/>
+          </p:cNvSpPr>
+          <p:nvPr>
+            <p:ph idx="1"/>
+          </p:nvPr>
+        </p:nvSpPr>
+        <p:spPr>
+          <a:xfrm>
+            <a:off x="838200" y="555585"/>
+            <a:ext cx="10515600" cy="5621378"/>
+          </a:xfrm>
+        </p:spPr>
+        <p:txBody>
+          <a:bodyPr>
+            <a:normAutofit/>
+          </a:bodyPr>
+          <a:lstStyle/>
+          <a:p>
+            <a:r>
+              <a:rPr lang="en-US" sz="1500" dirty="0" err="1">
+                <a:latin typeface="Courier New" panose="02070309020205020404" pitchFamily="49" charset="0"/>
+                <a:cs typeface="Courier New" panose="02070309020205020404" pitchFamily="49" charset="0"/>
+              </a:rPr>
+              <a:t>myUserName@myComputer</a:t>
+            </a:r>
+            <a:r>
+              <a:rPr lang="en-US" sz="1500" dirty="0">
+                <a:latin typeface="Courier New" panose="02070309020205020404" pitchFamily="49" charset="0"/>
+                <a:cs typeface="Courier New" panose="02070309020205020404" pitchFamily="49" charset="0"/>
+              </a:rPr>
+              <a:t>:/gitHub/_</a:t>
+            </a:r>
+            <a:r>
+              <a:rPr lang="en-US" sz="1500" dirty="0" err="1">
+                <a:latin typeface="Courier New" panose="02070309020205020404" pitchFamily="49" charset="0"/>
+                <a:cs typeface="Courier New" panose="02070309020205020404" pitchFamily="49" charset="0"/>
+              </a:rPr>
+              <a:t>myApps</a:t>
+            </a:r>
+            <a:r>
+              <a:rPr lang="en-US" sz="1500" dirty="0">
+                <a:latin typeface="Courier New" panose="02070309020205020404" pitchFamily="49" charset="0"/>
+                <a:cs typeface="Courier New" panose="02070309020205020404" pitchFamily="49" charset="0"/>
+              </a:rPr>
+              <a:t> $ </a:t>
+            </a:r>
+            <a:r>
+              <a:rPr lang="en-US" sz="1500" b="1" dirty="0">
+                <a:latin typeface="Courier New" panose="02070309020205020404" pitchFamily="49" charset="0"/>
+                <a:cs typeface="Courier New" panose="02070309020205020404" pitchFamily="49" charset="0"/>
+              </a:rPr>
+              <a:t>git clone </a:t>
+            </a:r>
+            <a:r>
+              <a:rPr lang="en-US" sz="1500" dirty="0">
+                <a:latin typeface="Courier New" panose="02070309020205020404" pitchFamily="49" charset="0"/>
+                <a:cs typeface="Courier New" panose="02070309020205020404" pitchFamily="49" charset="0"/>
+              </a:rPr>
+              <a:t>https://</a:t>
+            </a:r>
+            <a:r>
+              <a:rPr lang="en-US" sz="1500" dirty="0" err="1">
+                <a:latin typeface="Courier New" panose="02070309020205020404" pitchFamily="49" charset="0"/>
+                <a:cs typeface="Courier New" panose="02070309020205020404" pitchFamily="49" charset="0"/>
+              </a:rPr>
+              <a:t>github.com</a:t>
+            </a:r>
+            <a:r>
+              <a:rPr lang="en-US" sz="1500" dirty="0">
+                <a:latin typeface="Courier New" panose="02070309020205020404" pitchFamily="49" charset="0"/>
+                <a:cs typeface="Courier New" panose="02070309020205020404" pitchFamily="49" charset="0"/>
+              </a:rPr>
+              <a:t>/</a:t>
+            </a:r>
+            <a:r>
+              <a:rPr lang="en-US" sz="1500" dirty="0" err="1">
+                <a:latin typeface="Courier New" panose="02070309020205020404" pitchFamily="49" charset="0"/>
+                <a:cs typeface="Courier New" panose="02070309020205020404" pitchFamily="49" charset="0"/>
+              </a:rPr>
+              <a:t>johngchen</a:t>
+            </a:r>
+            <a:r>
+              <a:rPr lang="en-US" sz="1500" dirty="0">
+                <a:latin typeface="Courier New" panose="02070309020205020404" pitchFamily="49" charset="0"/>
+                <a:cs typeface="Courier New" panose="02070309020205020404" pitchFamily="49" charset="0"/>
+              </a:rPr>
+              <a:t>/</a:t>
+            </a:r>
+            <a:r>
+              <a:rPr lang="en-US" sz="1500" dirty="0" err="1">
+                <a:latin typeface="Courier New" panose="02070309020205020404" pitchFamily="49" charset="0"/>
+                <a:cs typeface="Courier New" panose="02070309020205020404" pitchFamily="49" charset="0"/>
+              </a:rPr>
+              <a:t>ai</a:t>
+            </a:r>
+            <a:r>
+              <a:rPr lang="en-US" sz="1500" dirty="0">
+                <a:latin typeface="Courier New" panose="02070309020205020404" pitchFamily="49" charset="0"/>
+                <a:cs typeface="Courier New" panose="02070309020205020404" pitchFamily="49" charset="0"/>
+              </a:rPr>
+              <a:t>-racing-</a:t>
+            </a:r>
+            <a:r>
+              <a:rPr lang="en-US" sz="1500" dirty="0" err="1">
+                <a:latin typeface="Courier New" panose="02070309020205020404" pitchFamily="49" charset="0"/>
+                <a:cs typeface="Courier New" panose="02070309020205020404" pitchFamily="49" charset="0"/>
+              </a:rPr>
+              <a:t>league.git</a:t>
+            </a:r>
+            <a:endParaRPr lang="en-US" sz="1500" dirty="0">
+              <a:latin typeface="Courier New" panose="02070309020205020404" pitchFamily="49" charset="0"/>
+              <a:cs typeface="Courier New" panose="02070309020205020404" pitchFamily="49" charset="0"/>
+            </a:endParaRPr>
+          </a:p>
+          <a:p>
+            <a:r>
+              <a:rPr lang="en-US" sz="1500" dirty="0" err="1">
+                <a:latin typeface="Courier New" panose="02070309020205020404" pitchFamily="49" charset="0"/>
+                <a:cs typeface="Courier New" panose="02070309020205020404" pitchFamily="49" charset="0"/>
+              </a:rPr>
+              <a:t>myUserName@myComputer</a:t>
+            </a:r>
+            <a:r>
+              <a:rPr lang="en-US" sz="1500" dirty="0">
+                <a:latin typeface="Courier New" panose="02070309020205020404" pitchFamily="49" charset="0"/>
+                <a:cs typeface="Courier New" panose="02070309020205020404" pitchFamily="49" charset="0"/>
+              </a:rPr>
+              <a:t>:/gitHub/_</a:t>
+            </a:r>
+            <a:r>
+              <a:rPr lang="en-US" sz="1500" dirty="0" err="1">
+                <a:latin typeface="Courier New" panose="02070309020205020404" pitchFamily="49" charset="0"/>
+                <a:cs typeface="Courier New" panose="02070309020205020404" pitchFamily="49" charset="0"/>
+              </a:rPr>
+              <a:t>myApps</a:t>
+            </a:r>
+            <a:r>
+              <a:rPr lang="en-US" sz="1500" dirty="0">
+                <a:latin typeface="Courier New" panose="02070309020205020404" pitchFamily="49" charset="0"/>
+                <a:cs typeface="Courier New" panose="02070309020205020404" pitchFamily="49" charset="0"/>
+              </a:rPr>
+              <a:t> $ </a:t>
+            </a:r>
+            <a:r>
+              <a:rPr lang="en-US" sz="1500" b="1" dirty="0">
+                <a:latin typeface="Courier New" panose="02070309020205020404" pitchFamily="49" charset="0"/>
+                <a:cs typeface="Courier New" panose="02070309020205020404" pitchFamily="49" charset="0"/>
+              </a:rPr>
+              <a:t>cd </a:t>
+            </a:r>
+            <a:r>
+              <a:rPr lang="en-US" sz="1500" b="1" dirty="0" err="1">
+                <a:latin typeface="Courier New" panose="02070309020205020404" pitchFamily="49" charset="0"/>
+                <a:cs typeface="Courier New" panose="02070309020205020404" pitchFamily="49" charset="0"/>
+              </a:rPr>
+              <a:t>ai</a:t>
+            </a:r>
+            <a:r>
+              <a:rPr lang="en-US" sz="1500" b="1" dirty="0">
+                <a:latin typeface="Courier New" panose="02070309020205020404" pitchFamily="49" charset="0"/>
+                <a:cs typeface="Courier New" panose="02070309020205020404" pitchFamily="49" charset="0"/>
+              </a:rPr>
+              <a:t>-racing-league/</a:t>
+            </a:r>
+          </a:p>
+          <a:p>
+            <a:r>
+              <a:rPr lang="en-US" sz="1500" dirty="0" err="1">
+                <a:latin typeface="Courier New" panose="02070309020205020404" pitchFamily="49" charset="0"/>
+                <a:cs typeface="Courier New" panose="02070309020205020404" pitchFamily="49" charset="0"/>
+              </a:rPr>
+              <a:t>myUserName@myComputer</a:t>
+            </a:r>
+            <a:r>
+              <a:rPr lang="en-US" sz="1500" dirty="0">
+                <a:latin typeface="Courier New" panose="02070309020205020404" pitchFamily="49" charset="0"/>
+                <a:cs typeface="Courier New" panose="02070309020205020404" pitchFamily="49" charset="0"/>
+              </a:rPr>
+              <a:t>:/gitHub/_</a:t>
+            </a:r>
+            <a:r>
+              <a:rPr lang="en-US" sz="1500" dirty="0" err="1">
+                <a:latin typeface="Courier New" panose="02070309020205020404" pitchFamily="49" charset="0"/>
+                <a:cs typeface="Courier New" panose="02070309020205020404" pitchFamily="49" charset="0"/>
+              </a:rPr>
+              <a:t>myApps</a:t>
+            </a:r>
+            <a:r>
+              <a:rPr lang="en-US" sz="1500" dirty="0">
+                <a:latin typeface="Courier New" panose="02070309020205020404" pitchFamily="49" charset="0"/>
+                <a:cs typeface="Courier New" panose="02070309020205020404" pitchFamily="49" charset="0"/>
+              </a:rPr>
+              <a:t>/</a:t>
+            </a:r>
+            <a:r>
+              <a:rPr lang="en-US" sz="1500" dirty="0" err="1">
+                <a:latin typeface="Courier New" panose="02070309020205020404" pitchFamily="49" charset="0"/>
+                <a:cs typeface="Courier New" panose="02070309020205020404" pitchFamily="49" charset="0"/>
+              </a:rPr>
+              <a:t>ai</a:t>
+            </a:r>
+            <a:r>
+              <a:rPr lang="en-US" sz="1500" dirty="0">
+                <a:latin typeface="Courier New" panose="02070309020205020404" pitchFamily="49" charset="0"/>
+                <a:cs typeface="Courier New" panose="02070309020205020404" pitchFamily="49" charset="0"/>
+              </a:rPr>
+              <a:t>-racing-league $ </a:t>
+            </a:r>
+            <a:r>
+              <a:rPr lang="en-US" sz="1500" b="1" dirty="0">
+                <a:latin typeface="Courier New" panose="02070309020205020404" pitchFamily="49" charset="0"/>
+                <a:cs typeface="Courier New" panose="02070309020205020404" pitchFamily="49" charset="0"/>
+              </a:rPr>
+              <a:t>touch </a:t>
+            </a:r>
+            <a:r>
+              <a:rPr lang="en-US" sz="1500" b="1" dirty="0" err="1">
+                <a:latin typeface="Courier New" panose="02070309020205020404" pitchFamily="49" charset="0"/>
+                <a:cs typeface="Courier New" panose="02070309020205020404" pitchFamily="49" charset="0"/>
+              </a:rPr>
+              <a:t>myDemo.txt</a:t>
+            </a:r>
+            <a:endParaRPr lang="en-US" sz="1500" b="1" dirty="0">
+              <a:latin typeface="Courier New" panose="02070309020205020404" pitchFamily="49" charset="0"/>
+              <a:cs typeface="Courier New" panose="02070309020205020404" pitchFamily="49" charset="0"/>
+            </a:endParaRPr>
+          </a:p>
+          <a:p>
+            <a:r>
+              <a:rPr lang="en-US" sz="1500" dirty="0" err="1">
+                <a:latin typeface="Courier New" panose="02070309020205020404" pitchFamily="49" charset="0"/>
+                <a:cs typeface="Courier New" panose="02070309020205020404" pitchFamily="49" charset="0"/>
+              </a:rPr>
+              <a:t>myUserName@myComputer</a:t>
+            </a:r>
+            <a:r>
+              <a:rPr lang="en-US" sz="1500" dirty="0">
+                <a:latin typeface="Courier New" panose="02070309020205020404" pitchFamily="49" charset="0"/>
+                <a:cs typeface="Courier New" panose="02070309020205020404" pitchFamily="49" charset="0"/>
+              </a:rPr>
+              <a:t>:/gitHub/_</a:t>
+            </a:r>
+            <a:r>
+              <a:rPr lang="en-US" sz="1500" dirty="0" err="1">
+                <a:latin typeface="Courier New" panose="02070309020205020404" pitchFamily="49" charset="0"/>
+                <a:cs typeface="Courier New" panose="02070309020205020404" pitchFamily="49" charset="0"/>
+              </a:rPr>
+              <a:t>myApps</a:t>
+            </a:r>
+            <a:r>
+              <a:rPr lang="en-US" sz="1500" dirty="0">
+                <a:latin typeface="Courier New" panose="02070309020205020404" pitchFamily="49" charset="0"/>
+                <a:cs typeface="Courier New" panose="02070309020205020404" pitchFamily="49" charset="0"/>
+              </a:rPr>
+              <a:t>/</a:t>
+            </a:r>
+            <a:r>
+              <a:rPr lang="en-US" sz="1500" dirty="0" err="1">
+                <a:latin typeface="Courier New" panose="02070309020205020404" pitchFamily="49" charset="0"/>
+                <a:cs typeface="Courier New" panose="02070309020205020404" pitchFamily="49" charset="0"/>
+              </a:rPr>
+              <a:t>ai</a:t>
+            </a:r>
+            <a:r>
+              <a:rPr lang="en-US" sz="1500" dirty="0">
+                <a:latin typeface="Courier New" panose="02070309020205020404" pitchFamily="49" charset="0"/>
+                <a:cs typeface="Courier New" panose="02070309020205020404" pitchFamily="49" charset="0"/>
+              </a:rPr>
+              <a:t>-racing-league $ </a:t>
+            </a:r>
+            <a:r>
+              <a:rPr lang="en-US" sz="1500" b="1" dirty="0">
+                <a:latin typeface="Courier New" panose="02070309020205020404" pitchFamily="49" charset="0"/>
+                <a:cs typeface="Courier New" panose="02070309020205020404" pitchFamily="49" charset="0"/>
+              </a:rPr>
+              <a:t>git status</a:t>
+            </a:r>
+          </a:p>
+          <a:p>
+            <a:r>
+              <a:rPr lang="en-US" sz="1500" dirty="0" err="1">
+                <a:latin typeface="Courier New" panose="02070309020205020404" pitchFamily="49" charset="0"/>
+                <a:cs typeface="Courier New" panose="02070309020205020404" pitchFamily="49" charset="0"/>
+              </a:rPr>
+              <a:t>myUserName@myComputer</a:t>
+            </a:r>
+            <a:r>
+              <a:rPr lang="en-US" sz="1500" dirty="0">
+                <a:latin typeface="Courier New" panose="02070309020205020404" pitchFamily="49" charset="0"/>
+                <a:cs typeface="Courier New" panose="02070309020205020404" pitchFamily="49" charset="0"/>
+              </a:rPr>
+              <a:t>:/gitHub/_</a:t>
+            </a:r>
+            <a:r>
+              <a:rPr lang="en-US" sz="1500" dirty="0" err="1">
+                <a:latin typeface="Courier New" panose="02070309020205020404" pitchFamily="49" charset="0"/>
+                <a:cs typeface="Courier New" panose="02070309020205020404" pitchFamily="49" charset="0"/>
+              </a:rPr>
+              <a:t>myApps</a:t>
+            </a:r>
+            <a:r>
+              <a:rPr lang="en-US" sz="1500" dirty="0">
+                <a:latin typeface="Courier New" panose="02070309020205020404" pitchFamily="49" charset="0"/>
+                <a:cs typeface="Courier New" panose="02070309020205020404" pitchFamily="49" charset="0"/>
+              </a:rPr>
+              <a:t>/</a:t>
+            </a:r>
+            <a:r>
+              <a:rPr lang="en-US" sz="1500" dirty="0" err="1">
+                <a:latin typeface="Courier New" panose="02070309020205020404" pitchFamily="49" charset="0"/>
+                <a:cs typeface="Courier New" panose="02070309020205020404" pitchFamily="49" charset="0"/>
+              </a:rPr>
+              <a:t>ai</a:t>
+            </a:r>
+            <a:r>
+              <a:rPr lang="en-US" sz="1500" dirty="0">
+                <a:latin typeface="Courier New" panose="02070309020205020404" pitchFamily="49" charset="0"/>
+                <a:cs typeface="Courier New" panose="02070309020205020404" pitchFamily="49" charset="0"/>
+              </a:rPr>
+              <a:t>-racing-league $ </a:t>
+            </a:r>
+            <a:r>
+              <a:rPr lang="en-US" sz="1500" b="1" dirty="0">
+                <a:latin typeface="Courier New" panose="02070309020205020404" pitchFamily="49" charset="0"/>
+                <a:cs typeface="Courier New" panose="02070309020205020404" pitchFamily="49" charset="0"/>
+              </a:rPr>
+              <a:t>git add .</a:t>
+            </a:r>
+          </a:p>
+          <a:p>
+            <a:r>
+              <a:rPr lang="en-US" sz="1500" dirty="0" err="1">
+                <a:latin typeface="Courier New" panose="02070309020205020404" pitchFamily="49" charset="0"/>
+                <a:cs typeface="Courier New" panose="02070309020205020404" pitchFamily="49" charset="0"/>
+              </a:rPr>
+              <a:t>myUserName@myComputer</a:t>
+            </a:r>
+            <a:r>
+              <a:rPr lang="en-US" sz="1500" dirty="0">
+                <a:latin typeface="Courier New" panose="02070309020205020404" pitchFamily="49" charset="0"/>
+                <a:cs typeface="Courier New" panose="02070309020205020404" pitchFamily="49" charset="0"/>
+              </a:rPr>
+              <a:t>:/gitHub/_</a:t>
+            </a:r>
+            <a:r>
+              <a:rPr lang="en-US" sz="1500" dirty="0" err="1">
+                <a:latin typeface="Courier New" panose="02070309020205020404" pitchFamily="49" charset="0"/>
+                <a:cs typeface="Courier New" panose="02070309020205020404" pitchFamily="49" charset="0"/>
+              </a:rPr>
+              <a:t>myApps</a:t>
+            </a:r>
+            <a:r>
+              <a:rPr lang="en-US" sz="1500" dirty="0">
+                <a:latin typeface="Courier New" panose="02070309020205020404" pitchFamily="49" charset="0"/>
+                <a:cs typeface="Courier New" panose="02070309020205020404" pitchFamily="49" charset="0"/>
+              </a:rPr>
+              <a:t>/</a:t>
+            </a:r>
+            <a:r>
+              <a:rPr lang="en-US" sz="1500" dirty="0" err="1">
+                <a:latin typeface="Courier New" panose="02070309020205020404" pitchFamily="49" charset="0"/>
+                <a:cs typeface="Courier New" panose="02070309020205020404" pitchFamily="49" charset="0"/>
+              </a:rPr>
+              <a:t>ai</a:t>
+            </a:r>
+            <a:r>
+              <a:rPr lang="en-US" sz="1500" dirty="0">
+                <a:latin typeface="Courier New" panose="02070309020205020404" pitchFamily="49" charset="0"/>
+                <a:cs typeface="Courier New" panose="02070309020205020404" pitchFamily="49" charset="0"/>
+              </a:rPr>
+              <a:t>-racing-league $ </a:t>
+            </a:r>
+            <a:r>
+              <a:rPr lang="en-US" sz="1500" b="1" dirty="0">
+                <a:latin typeface="Courier New" panose="02070309020205020404" pitchFamily="49" charset="0"/>
+                <a:cs typeface="Courier New" panose="02070309020205020404" pitchFamily="49" charset="0"/>
+              </a:rPr>
+              <a:t>git commit -m "just a demo"</a:t>
+            </a:r>
+          </a:p>
+          <a:p>
+            <a:r>
+              <a:rPr lang="en-US" sz="1500" dirty="0" err="1">
+                <a:latin typeface="Courier New" panose="02070309020205020404" pitchFamily="49" charset="0"/>
+                <a:cs typeface="Courier New" panose="02070309020205020404" pitchFamily="49" charset="0"/>
+              </a:rPr>
+              <a:t>myUserName@myComputer</a:t>
+            </a:r>
+            <a:r>
+              <a:rPr lang="en-US" sz="1500" dirty="0">
+                <a:latin typeface="Courier New" panose="02070309020205020404" pitchFamily="49" charset="0"/>
+                <a:cs typeface="Courier New" panose="02070309020205020404" pitchFamily="49" charset="0"/>
+              </a:rPr>
+              <a:t>:/gitHub/_</a:t>
+            </a:r>
+            <a:r>
+              <a:rPr lang="en-US" sz="1500" dirty="0" err="1">
+                <a:latin typeface="Courier New" panose="02070309020205020404" pitchFamily="49" charset="0"/>
+                <a:cs typeface="Courier New" panose="02070309020205020404" pitchFamily="49" charset="0"/>
+              </a:rPr>
+              <a:t>myApps</a:t>
+            </a:r>
+            <a:r>
+              <a:rPr lang="en-US" sz="1500" dirty="0">
+                <a:latin typeface="Courier New" panose="02070309020205020404" pitchFamily="49" charset="0"/>
+                <a:cs typeface="Courier New" panose="02070309020205020404" pitchFamily="49" charset="0"/>
+              </a:rPr>
+              <a:t>/</a:t>
+            </a:r>
+            <a:r>
+              <a:rPr lang="en-US" sz="1500" dirty="0" err="1">
+                <a:latin typeface="Courier New" panose="02070309020205020404" pitchFamily="49" charset="0"/>
+                <a:cs typeface="Courier New" panose="02070309020205020404" pitchFamily="49" charset="0"/>
+              </a:rPr>
+              <a:t>ai</a:t>
+            </a:r>
+            <a:r>
+              <a:rPr lang="en-US" sz="1500" dirty="0">
+                <a:latin typeface="Courier New" panose="02070309020205020404" pitchFamily="49" charset="0"/>
+                <a:cs typeface="Courier New" panose="02070309020205020404" pitchFamily="49" charset="0"/>
+              </a:rPr>
+              <a:t>-racing-league $ </a:t>
+            </a:r>
+            <a:r>
+              <a:rPr lang="en-US" sz="1500" b="1" dirty="0">
+                <a:latin typeface="Courier New" panose="02070309020205020404" pitchFamily="49" charset="0"/>
+                <a:cs typeface="Courier New" panose="02070309020205020404" pitchFamily="49" charset="0"/>
+              </a:rPr>
+              <a:t>git push</a:t>
+            </a:r>
+          </a:p>
+          <a:p>
+            <a:pPr marL="0" indent="0">
+              <a:buNone/>
+            </a:pPr>
+            <a:endParaRPr lang="en-US" dirty="0">
+              <a:latin typeface="Courier New" panose="02070309020205020404" pitchFamily="49" charset="0"/>
+              <a:cs typeface="Courier New" panose="02070309020205020404" pitchFamily="49" charset="0"/>
+            </a:endParaRPr>
+          </a:p>
+        </p:txBody>
+      </p:sp>
+    </p:spTree>
+    <p:extLst>
+      <p:ext uri="{BB962C8B-B14F-4D97-AF65-F5344CB8AC3E}">
+        <p14:creationId xmlns:p14="http://schemas.microsoft.com/office/powerpoint/2010/main" val="2904767785"/>
+      </p:ext>
+    </p:extLst>
+  </p:cSld>
+  <p:clrMapOvr>
+    <a:masterClrMapping/>
+  </p:clrMapOvr>
+</p:sld>
+</file>
+
+<file path=ppt/slides/slide12.xml><?xml version="1.0" encoding="utf-8"?>
+<p:sld xmlns:a="http://schemas.openxmlformats.org/drawingml/2006/main" xmlns:r="http://schemas.openxmlformats.org/officeDocument/2006/relationships" xmlns:p="http://schemas.openxmlformats.org/presentationml/2006/main">
+  <p:cSld>
+    <p:spTree>
+      <p:nvGrpSpPr>
+        <p:cNvPr id="1" name=""/>
+        <p:cNvGrpSpPr/>
+        <p:nvPr/>
+      </p:nvGrpSpPr>
+      <p:grpSpPr>
+        <a:xfrm>
+          <a:off x="0" y="0"/>
+          <a:ext cx="0" cy="0"/>
+          <a:chOff x="0" y="0"/>
+          <a:chExt cx="0" cy="0"/>
+        </a:xfrm>
+      </p:grpSpPr>
+      <p:sp>
+        <p:nvSpPr>
+          <p:cNvPr id="2" name="Title 1">
+            <a:extLst>
+              <a:ext uri="{FF2B5EF4-FFF2-40B4-BE49-F238E27FC236}">
+                <a16:creationId xmlns:a16="http://schemas.microsoft.com/office/drawing/2014/main" id="{35BE765F-EE8F-3B4A-A714-7D2A1BEDE03C}"/>
+              </a:ext>
+            </a:extLst>
+          </p:cNvPr>
+          <p:cNvSpPr>
+            <a:spLocks noGrp="1"/>
+          </p:cNvSpPr>
+          <p:nvPr>
+            <p:ph type="title"/>
+          </p:nvPr>
+        </p:nvSpPr>
+        <p:spPr/>
+        <p:txBody>
+          <a:bodyPr/>
+          <a:lstStyle/>
+          <a:p>
+            <a:pPr algn="ctr"/>
+            <a:r>
+              <a:rPr lang="en-US" dirty="0"/>
+              <a:t>Git – Some Useful Info</a:t>
+            </a:r>
+          </a:p>
+        </p:txBody>
+      </p:sp>
+      <p:sp>
+        <p:nvSpPr>
+          <p:cNvPr id="3" name="Content Placeholder 2">
+            <a:extLst>
+              <a:ext uri="{FF2B5EF4-FFF2-40B4-BE49-F238E27FC236}">
+                <a16:creationId xmlns:a16="http://schemas.microsoft.com/office/drawing/2014/main" id="{4D2CCB5E-5517-CA45-A3DC-E1C1500C22C2}"/>
+              </a:ext>
+            </a:extLst>
+          </p:cNvPr>
+          <p:cNvSpPr>
+            <a:spLocks noGrp="1"/>
+          </p:cNvSpPr>
+          <p:nvPr>
+            <p:ph idx="1"/>
+          </p:nvPr>
+        </p:nvSpPr>
+        <p:spPr/>
+        <p:txBody>
+          <a:bodyPr/>
+          <a:lstStyle/>
+          <a:p>
+            <a:r>
+              <a:rPr lang="en-US" dirty="0">
+                <a:hlinkClick r:id="rId2"/>
+              </a:rPr>
+              <a:t>https://gist.github.com/arttuladhar/5887559</a:t>
+            </a:r>
+            <a:endParaRPr lang="en-US" dirty="0"/>
+          </a:p>
+          <a:p>
+            <a:r>
+              <a:rPr lang="en-US" dirty="0">
+                <a:hlinkClick r:id="rId3"/>
+              </a:rPr>
+              <a:t>https://gist.github.com/jedmao/5053440</a:t>
+            </a:r>
+            <a:endParaRPr lang="en-US" dirty="0"/>
+          </a:p>
+          <a:p>
+            <a:r>
+              <a:rPr lang="en-US" dirty="0">
+                <a:hlinkClick r:id="rId4"/>
+              </a:rPr>
+              <a:t>https://git-scm.com/docs</a:t>
+            </a:r>
+            <a:endParaRPr lang="en-US" dirty="0"/>
+          </a:p>
+          <a:p>
+            <a:r>
+              <a:rPr lang="en-US" dirty="0">
+                <a:hlinkClick r:id="rId5"/>
+              </a:rPr>
+              <a:t>https://www.atlassian.com/git/tutorials</a:t>
+            </a:r>
+          </a:p>
+          <a:p>
+            <a:r>
+              <a:rPr lang="en-US" dirty="0">
+                <a:hlinkClick r:id="rId5"/>
+              </a:rPr>
+              <a:t>www.google.com</a:t>
+            </a:r>
+            <a:endParaRPr lang="en-US" dirty="0"/>
+          </a:p>
+          <a:p>
+            <a:endParaRPr lang="en-US" dirty="0"/>
+          </a:p>
+          <a:p>
+            <a:endParaRPr lang="en-US" dirty="0"/>
+          </a:p>
+          <a:p>
+            <a:endParaRPr lang="en-US" dirty="0"/>
+          </a:p>
+          <a:p>
+            <a:endParaRPr lang="en-US" dirty="0"/>
+          </a:p>
+        </p:txBody>
+      </p:sp>
+    </p:spTree>
+    <p:extLst>
+      <p:ext uri="{BB962C8B-B14F-4D97-AF65-F5344CB8AC3E}">
+        <p14:creationId xmlns:p14="http://schemas.microsoft.com/office/powerpoint/2010/main" val="1357035687"/>
+      </p:ext>
+    </p:extLst>
+  </p:cSld>
+  <p:clrMapOvr>
+    <a:masterClrMapping/>
+  </p:clrMapOvr>
+</p:sld>
+</file>
+
+<file path=ppt/slides/slide2.xml><?xml version="1.0" encoding="utf-8"?>
+<p:sld xmlns:a="http://schemas.openxmlformats.org/drawingml/2006/main" xmlns:r="http://schemas.openxmlformats.org/officeDocument/2006/relationships" xmlns:p="http://schemas.openxmlformats.org/presentationml/2006/main">
+  <p:cSld>
+    <p:spTree>
+      <p:nvGrpSpPr>
         <p:cNvPr id="1" name=""/>
         <p:cNvGrpSpPr/>
         <p:nvPr/>
@@ -3690,626 +5563,7 @@
 </p:sld>
 </file>
 
-<file path=ppt/slides/slide10.xml><?xml version="1.0" encoding="utf-8"?>
-<p:sld xmlns:a="http://schemas.openxmlformats.org/drawingml/2006/main" xmlns:r="http://schemas.openxmlformats.org/officeDocument/2006/relationships" xmlns:p="http://schemas.openxmlformats.org/presentationml/2006/main">
-  <p:cSld>
-    <p:spTree>
-      <p:nvGrpSpPr>
-        <p:cNvPr id="1" name=""/>
-        <p:cNvGrpSpPr/>
-        <p:nvPr/>
-      </p:nvGrpSpPr>
-      <p:grpSpPr>
-        <a:xfrm>
-          <a:off x="0" y="0"/>
-          <a:ext cx="0" cy="0"/>
-          <a:chOff x="0" y="0"/>
-          <a:chExt cx="0" cy="0"/>
-        </a:xfrm>
-      </p:grpSpPr>
-      <p:sp>
-        <p:nvSpPr>
-          <p:cNvPr id="3" name="Content Placeholder 2">
-            <a:extLst>
-              <a:ext uri="{FF2B5EF4-FFF2-40B4-BE49-F238E27FC236}">
-                <a16:creationId xmlns:a16="http://schemas.microsoft.com/office/drawing/2014/main" id="{4D2CCB5E-5517-CA45-A3DC-E1C1500C22C2}"/>
-              </a:ext>
-            </a:extLst>
-          </p:cNvPr>
-          <p:cNvSpPr>
-            <a:spLocks noGrp="1"/>
-          </p:cNvSpPr>
-          <p:nvPr>
-            <p:ph idx="1"/>
-          </p:nvPr>
-        </p:nvSpPr>
-        <p:spPr>
-          <a:xfrm>
-            <a:off x="838200" y="555585"/>
-            <a:ext cx="10515600" cy="5621378"/>
-          </a:xfrm>
-        </p:spPr>
-        <p:txBody>
-          <a:bodyPr>
-            <a:normAutofit/>
-          </a:bodyPr>
-          <a:lstStyle/>
-          <a:p>
-            <a:r>
-              <a:rPr lang="en-US" sz="1500" dirty="0" err="1">
-                <a:latin typeface="Courier New" panose="02070309020205020404" pitchFamily="49" charset="0"/>
-                <a:cs typeface="Courier New" panose="02070309020205020404" pitchFamily="49" charset="0"/>
-              </a:rPr>
-              <a:t>myUserName@myComputer</a:t>
-            </a:r>
-            <a:r>
-              <a:rPr lang="en-US" sz="1500" dirty="0">
-                <a:latin typeface="Courier New" panose="02070309020205020404" pitchFamily="49" charset="0"/>
-                <a:cs typeface="Courier New" panose="02070309020205020404" pitchFamily="49" charset="0"/>
-              </a:rPr>
-              <a:t>:/gitHub/_</a:t>
-            </a:r>
-            <a:r>
-              <a:rPr lang="en-US" sz="1500" dirty="0" err="1">
-                <a:latin typeface="Courier New" panose="02070309020205020404" pitchFamily="49" charset="0"/>
-                <a:cs typeface="Courier New" panose="02070309020205020404" pitchFamily="49" charset="0"/>
-              </a:rPr>
-              <a:t>myApps</a:t>
-            </a:r>
-            <a:r>
-              <a:rPr lang="en-US" sz="1500" dirty="0">
-                <a:latin typeface="Courier New" panose="02070309020205020404" pitchFamily="49" charset="0"/>
-                <a:cs typeface="Courier New" panose="02070309020205020404" pitchFamily="49" charset="0"/>
-              </a:rPr>
-              <a:t> $ </a:t>
-            </a:r>
-            <a:r>
-              <a:rPr lang="en-US" sz="1500" b="1" dirty="0">
-                <a:latin typeface="Courier New" panose="02070309020205020404" pitchFamily="49" charset="0"/>
-                <a:cs typeface="Courier New" panose="02070309020205020404" pitchFamily="49" charset="0"/>
-              </a:rPr>
-              <a:t>git clone </a:t>
-            </a:r>
-            <a:r>
-              <a:rPr lang="en-US" sz="1500" dirty="0">
-                <a:latin typeface="Courier New" panose="02070309020205020404" pitchFamily="49" charset="0"/>
-                <a:cs typeface="Courier New" panose="02070309020205020404" pitchFamily="49" charset="0"/>
-              </a:rPr>
-              <a:t>https://</a:t>
-            </a:r>
-            <a:r>
-              <a:rPr lang="en-US" sz="1500" dirty="0" err="1">
-                <a:latin typeface="Courier New" panose="02070309020205020404" pitchFamily="49" charset="0"/>
-                <a:cs typeface="Courier New" panose="02070309020205020404" pitchFamily="49" charset="0"/>
-              </a:rPr>
-              <a:t>github.com</a:t>
-            </a:r>
-            <a:r>
-              <a:rPr lang="en-US" sz="1500" dirty="0">
-                <a:latin typeface="Courier New" panose="02070309020205020404" pitchFamily="49" charset="0"/>
-                <a:cs typeface="Courier New" panose="02070309020205020404" pitchFamily="49" charset="0"/>
-              </a:rPr>
-              <a:t>/</a:t>
-            </a:r>
-            <a:r>
-              <a:rPr lang="en-US" sz="1500" dirty="0" err="1">
-                <a:latin typeface="Courier New" panose="02070309020205020404" pitchFamily="49" charset="0"/>
-                <a:cs typeface="Courier New" panose="02070309020205020404" pitchFamily="49" charset="0"/>
-              </a:rPr>
-              <a:t>johngchen</a:t>
-            </a:r>
-            <a:r>
-              <a:rPr lang="en-US" sz="1500" dirty="0">
-                <a:latin typeface="Courier New" panose="02070309020205020404" pitchFamily="49" charset="0"/>
-                <a:cs typeface="Courier New" panose="02070309020205020404" pitchFamily="49" charset="0"/>
-              </a:rPr>
-              <a:t>/</a:t>
-            </a:r>
-            <a:r>
-              <a:rPr lang="en-US" sz="1500" dirty="0" err="1">
-                <a:latin typeface="Courier New" panose="02070309020205020404" pitchFamily="49" charset="0"/>
-                <a:cs typeface="Courier New" panose="02070309020205020404" pitchFamily="49" charset="0"/>
-              </a:rPr>
-              <a:t>ai</a:t>
-            </a:r>
-            <a:r>
-              <a:rPr lang="en-US" sz="1500" dirty="0">
-                <a:latin typeface="Courier New" panose="02070309020205020404" pitchFamily="49" charset="0"/>
-                <a:cs typeface="Courier New" panose="02070309020205020404" pitchFamily="49" charset="0"/>
-              </a:rPr>
-              <a:t>-racing-</a:t>
-            </a:r>
-            <a:r>
-              <a:rPr lang="en-US" sz="1500" dirty="0" err="1">
-                <a:latin typeface="Courier New" panose="02070309020205020404" pitchFamily="49" charset="0"/>
-                <a:cs typeface="Courier New" panose="02070309020205020404" pitchFamily="49" charset="0"/>
-              </a:rPr>
-              <a:t>league.git</a:t>
-            </a:r>
-            <a:endParaRPr lang="en-US" sz="1500" dirty="0">
-              <a:latin typeface="Courier New" panose="02070309020205020404" pitchFamily="49" charset="0"/>
-              <a:cs typeface="Courier New" panose="02070309020205020404" pitchFamily="49" charset="0"/>
-            </a:endParaRPr>
-          </a:p>
-          <a:p>
-            <a:r>
-              <a:rPr lang="en-US" sz="1500" dirty="0" err="1">
-                <a:latin typeface="Courier New" panose="02070309020205020404" pitchFamily="49" charset="0"/>
-                <a:cs typeface="Courier New" panose="02070309020205020404" pitchFamily="49" charset="0"/>
-              </a:rPr>
-              <a:t>myUserName@myComputer</a:t>
-            </a:r>
-            <a:r>
-              <a:rPr lang="en-US" sz="1500" dirty="0">
-                <a:latin typeface="Courier New" panose="02070309020205020404" pitchFamily="49" charset="0"/>
-                <a:cs typeface="Courier New" panose="02070309020205020404" pitchFamily="49" charset="0"/>
-              </a:rPr>
-              <a:t>:/gitHub/_</a:t>
-            </a:r>
-            <a:r>
-              <a:rPr lang="en-US" sz="1500" dirty="0" err="1">
-                <a:latin typeface="Courier New" panose="02070309020205020404" pitchFamily="49" charset="0"/>
-                <a:cs typeface="Courier New" panose="02070309020205020404" pitchFamily="49" charset="0"/>
-              </a:rPr>
-              <a:t>myApps</a:t>
-            </a:r>
-            <a:r>
-              <a:rPr lang="en-US" sz="1500" dirty="0">
-                <a:latin typeface="Courier New" panose="02070309020205020404" pitchFamily="49" charset="0"/>
-                <a:cs typeface="Courier New" panose="02070309020205020404" pitchFamily="49" charset="0"/>
-              </a:rPr>
-              <a:t> $ </a:t>
-            </a:r>
-            <a:r>
-              <a:rPr lang="en-US" sz="1500" b="1" dirty="0">
-                <a:latin typeface="Courier New" panose="02070309020205020404" pitchFamily="49" charset="0"/>
-                <a:cs typeface="Courier New" panose="02070309020205020404" pitchFamily="49" charset="0"/>
-              </a:rPr>
-              <a:t>cd </a:t>
-            </a:r>
-            <a:r>
-              <a:rPr lang="en-US" sz="1500" b="1" dirty="0" err="1">
-                <a:latin typeface="Courier New" panose="02070309020205020404" pitchFamily="49" charset="0"/>
-                <a:cs typeface="Courier New" panose="02070309020205020404" pitchFamily="49" charset="0"/>
-              </a:rPr>
-              <a:t>ai</a:t>
-            </a:r>
-            <a:r>
-              <a:rPr lang="en-US" sz="1500" b="1" dirty="0">
-                <a:latin typeface="Courier New" panose="02070309020205020404" pitchFamily="49" charset="0"/>
-                <a:cs typeface="Courier New" panose="02070309020205020404" pitchFamily="49" charset="0"/>
-              </a:rPr>
-              <a:t>-racing-league/</a:t>
-            </a:r>
-          </a:p>
-          <a:p>
-            <a:r>
-              <a:rPr lang="en-US" sz="1500" dirty="0" err="1">
-                <a:latin typeface="Courier New" panose="02070309020205020404" pitchFamily="49" charset="0"/>
-                <a:cs typeface="Courier New" panose="02070309020205020404" pitchFamily="49" charset="0"/>
-              </a:rPr>
-              <a:t>myUserName@myComputer</a:t>
-            </a:r>
-            <a:r>
-              <a:rPr lang="en-US" sz="1500" dirty="0">
-                <a:latin typeface="Courier New" panose="02070309020205020404" pitchFamily="49" charset="0"/>
-                <a:cs typeface="Courier New" panose="02070309020205020404" pitchFamily="49" charset="0"/>
-              </a:rPr>
-              <a:t>:/gitHub/_</a:t>
-            </a:r>
-            <a:r>
-              <a:rPr lang="en-US" sz="1500" dirty="0" err="1">
-                <a:latin typeface="Courier New" panose="02070309020205020404" pitchFamily="49" charset="0"/>
-                <a:cs typeface="Courier New" panose="02070309020205020404" pitchFamily="49" charset="0"/>
-              </a:rPr>
-              <a:t>myApps</a:t>
-            </a:r>
-            <a:r>
-              <a:rPr lang="en-US" sz="1500" dirty="0">
-                <a:latin typeface="Courier New" panose="02070309020205020404" pitchFamily="49" charset="0"/>
-                <a:cs typeface="Courier New" panose="02070309020205020404" pitchFamily="49" charset="0"/>
-              </a:rPr>
-              <a:t>/</a:t>
-            </a:r>
-            <a:r>
-              <a:rPr lang="en-US" sz="1500" dirty="0" err="1">
-                <a:latin typeface="Courier New" panose="02070309020205020404" pitchFamily="49" charset="0"/>
-                <a:cs typeface="Courier New" panose="02070309020205020404" pitchFamily="49" charset="0"/>
-              </a:rPr>
-              <a:t>ai</a:t>
-            </a:r>
-            <a:r>
-              <a:rPr lang="en-US" sz="1500" dirty="0">
-                <a:latin typeface="Courier New" panose="02070309020205020404" pitchFamily="49" charset="0"/>
-                <a:cs typeface="Courier New" panose="02070309020205020404" pitchFamily="49" charset="0"/>
-              </a:rPr>
-              <a:t>-racing-league $ </a:t>
-            </a:r>
-            <a:r>
-              <a:rPr lang="en-US" sz="1500" b="1" dirty="0">
-                <a:latin typeface="Courier New" panose="02070309020205020404" pitchFamily="49" charset="0"/>
-                <a:cs typeface="Courier New" panose="02070309020205020404" pitchFamily="49" charset="0"/>
-              </a:rPr>
-              <a:t>touch </a:t>
-            </a:r>
-            <a:r>
-              <a:rPr lang="en-US" sz="1500" b="1" dirty="0" err="1">
-                <a:latin typeface="Courier New" panose="02070309020205020404" pitchFamily="49" charset="0"/>
-                <a:cs typeface="Courier New" panose="02070309020205020404" pitchFamily="49" charset="0"/>
-              </a:rPr>
-              <a:t>myDemo.txt</a:t>
-            </a:r>
-            <a:endParaRPr lang="en-US" sz="1500" b="1" dirty="0">
-              <a:latin typeface="Courier New" panose="02070309020205020404" pitchFamily="49" charset="0"/>
-              <a:cs typeface="Courier New" panose="02070309020205020404" pitchFamily="49" charset="0"/>
-            </a:endParaRPr>
-          </a:p>
-          <a:p>
-            <a:r>
-              <a:rPr lang="en-US" sz="1500" dirty="0" err="1">
-                <a:latin typeface="Courier New" panose="02070309020205020404" pitchFamily="49" charset="0"/>
-                <a:cs typeface="Courier New" panose="02070309020205020404" pitchFamily="49" charset="0"/>
-              </a:rPr>
-              <a:t>myUserName@myComputer</a:t>
-            </a:r>
-            <a:r>
-              <a:rPr lang="en-US" sz="1500" dirty="0">
-                <a:latin typeface="Courier New" panose="02070309020205020404" pitchFamily="49" charset="0"/>
-                <a:cs typeface="Courier New" panose="02070309020205020404" pitchFamily="49" charset="0"/>
-              </a:rPr>
-              <a:t>:/gitHub/_</a:t>
-            </a:r>
-            <a:r>
-              <a:rPr lang="en-US" sz="1500" dirty="0" err="1">
-                <a:latin typeface="Courier New" panose="02070309020205020404" pitchFamily="49" charset="0"/>
-                <a:cs typeface="Courier New" panose="02070309020205020404" pitchFamily="49" charset="0"/>
-              </a:rPr>
-              <a:t>myApps</a:t>
-            </a:r>
-            <a:r>
-              <a:rPr lang="en-US" sz="1500" dirty="0">
-                <a:latin typeface="Courier New" panose="02070309020205020404" pitchFamily="49" charset="0"/>
-                <a:cs typeface="Courier New" panose="02070309020205020404" pitchFamily="49" charset="0"/>
-              </a:rPr>
-              <a:t>/</a:t>
-            </a:r>
-            <a:r>
-              <a:rPr lang="en-US" sz="1500" dirty="0" err="1">
-                <a:latin typeface="Courier New" panose="02070309020205020404" pitchFamily="49" charset="0"/>
-                <a:cs typeface="Courier New" panose="02070309020205020404" pitchFamily="49" charset="0"/>
-              </a:rPr>
-              <a:t>ai</a:t>
-            </a:r>
-            <a:r>
-              <a:rPr lang="en-US" sz="1500" dirty="0">
-                <a:latin typeface="Courier New" panose="02070309020205020404" pitchFamily="49" charset="0"/>
-                <a:cs typeface="Courier New" panose="02070309020205020404" pitchFamily="49" charset="0"/>
-              </a:rPr>
-              <a:t>-racing-league $ </a:t>
-            </a:r>
-            <a:r>
-              <a:rPr lang="en-US" sz="1500" b="1" dirty="0">
-                <a:latin typeface="Courier New" panose="02070309020205020404" pitchFamily="49" charset="0"/>
-                <a:cs typeface="Courier New" panose="02070309020205020404" pitchFamily="49" charset="0"/>
-              </a:rPr>
-              <a:t>git status</a:t>
-            </a:r>
-          </a:p>
-          <a:p>
-            <a:r>
-              <a:rPr lang="en-US" sz="1500" dirty="0" err="1">
-                <a:latin typeface="Courier New" panose="02070309020205020404" pitchFamily="49" charset="0"/>
-                <a:cs typeface="Courier New" panose="02070309020205020404" pitchFamily="49" charset="0"/>
-              </a:rPr>
-              <a:t>myUserName@myComputer</a:t>
-            </a:r>
-            <a:r>
-              <a:rPr lang="en-US" sz="1500" dirty="0">
-                <a:latin typeface="Courier New" panose="02070309020205020404" pitchFamily="49" charset="0"/>
-                <a:cs typeface="Courier New" panose="02070309020205020404" pitchFamily="49" charset="0"/>
-              </a:rPr>
-              <a:t>:/gitHub/_</a:t>
-            </a:r>
-            <a:r>
-              <a:rPr lang="en-US" sz="1500" dirty="0" err="1">
-                <a:latin typeface="Courier New" panose="02070309020205020404" pitchFamily="49" charset="0"/>
-                <a:cs typeface="Courier New" panose="02070309020205020404" pitchFamily="49" charset="0"/>
-              </a:rPr>
-              <a:t>myApps</a:t>
-            </a:r>
-            <a:r>
-              <a:rPr lang="en-US" sz="1500" dirty="0">
-                <a:latin typeface="Courier New" panose="02070309020205020404" pitchFamily="49" charset="0"/>
-                <a:cs typeface="Courier New" panose="02070309020205020404" pitchFamily="49" charset="0"/>
-              </a:rPr>
-              <a:t>/</a:t>
-            </a:r>
-            <a:r>
-              <a:rPr lang="en-US" sz="1500" dirty="0" err="1">
-                <a:latin typeface="Courier New" panose="02070309020205020404" pitchFamily="49" charset="0"/>
-                <a:cs typeface="Courier New" panose="02070309020205020404" pitchFamily="49" charset="0"/>
-              </a:rPr>
-              <a:t>ai</a:t>
-            </a:r>
-            <a:r>
-              <a:rPr lang="en-US" sz="1500" dirty="0">
-                <a:latin typeface="Courier New" panose="02070309020205020404" pitchFamily="49" charset="0"/>
-                <a:cs typeface="Courier New" panose="02070309020205020404" pitchFamily="49" charset="0"/>
-              </a:rPr>
-              <a:t>-racing-league $ </a:t>
-            </a:r>
-            <a:r>
-              <a:rPr lang="en-US" sz="1500" b="1" dirty="0">
-                <a:latin typeface="Courier New" panose="02070309020205020404" pitchFamily="49" charset="0"/>
-                <a:cs typeface="Courier New" panose="02070309020205020404" pitchFamily="49" charset="0"/>
-              </a:rPr>
-              <a:t>git add .</a:t>
-            </a:r>
-          </a:p>
-          <a:p>
-            <a:r>
-              <a:rPr lang="en-US" sz="1500" dirty="0" err="1">
-                <a:latin typeface="Courier New" panose="02070309020205020404" pitchFamily="49" charset="0"/>
-                <a:cs typeface="Courier New" panose="02070309020205020404" pitchFamily="49" charset="0"/>
-              </a:rPr>
-              <a:t>myUserName@myComputer</a:t>
-            </a:r>
-            <a:r>
-              <a:rPr lang="en-US" sz="1500" dirty="0">
-                <a:latin typeface="Courier New" panose="02070309020205020404" pitchFamily="49" charset="0"/>
-                <a:cs typeface="Courier New" panose="02070309020205020404" pitchFamily="49" charset="0"/>
-              </a:rPr>
-              <a:t>:/gitHub/_</a:t>
-            </a:r>
-            <a:r>
-              <a:rPr lang="en-US" sz="1500" dirty="0" err="1">
-                <a:latin typeface="Courier New" panose="02070309020205020404" pitchFamily="49" charset="0"/>
-                <a:cs typeface="Courier New" panose="02070309020205020404" pitchFamily="49" charset="0"/>
-              </a:rPr>
-              <a:t>myApps</a:t>
-            </a:r>
-            <a:r>
-              <a:rPr lang="en-US" sz="1500" dirty="0">
-                <a:latin typeface="Courier New" panose="02070309020205020404" pitchFamily="49" charset="0"/>
-                <a:cs typeface="Courier New" panose="02070309020205020404" pitchFamily="49" charset="0"/>
-              </a:rPr>
-              <a:t>/</a:t>
-            </a:r>
-            <a:r>
-              <a:rPr lang="en-US" sz="1500" dirty="0" err="1">
-                <a:latin typeface="Courier New" panose="02070309020205020404" pitchFamily="49" charset="0"/>
-                <a:cs typeface="Courier New" panose="02070309020205020404" pitchFamily="49" charset="0"/>
-              </a:rPr>
-              <a:t>ai</a:t>
-            </a:r>
-            <a:r>
-              <a:rPr lang="en-US" sz="1500" dirty="0">
-                <a:latin typeface="Courier New" panose="02070309020205020404" pitchFamily="49" charset="0"/>
-                <a:cs typeface="Courier New" panose="02070309020205020404" pitchFamily="49" charset="0"/>
-              </a:rPr>
-              <a:t>-racing-league $ </a:t>
-            </a:r>
-            <a:r>
-              <a:rPr lang="en-US" sz="1500" b="1" dirty="0">
-                <a:latin typeface="Courier New" panose="02070309020205020404" pitchFamily="49" charset="0"/>
-                <a:cs typeface="Courier New" panose="02070309020205020404" pitchFamily="49" charset="0"/>
-              </a:rPr>
-              <a:t>git commit -m "just a demo"</a:t>
-            </a:r>
-          </a:p>
-          <a:p>
-            <a:r>
-              <a:rPr lang="en-US" sz="1500" dirty="0" err="1">
-                <a:latin typeface="Courier New" panose="02070309020205020404" pitchFamily="49" charset="0"/>
-                <a:cs typeface="Courier New" panose="02070309020205020404" pitchFamily="49" charset="0"/>
-              </a:rPr>
-              <a:t>myUserName@myComputer</a:t>
-            </a:r>
-            <a:r>
-              <a:rPr lang="en-US" sz="1500" dirty="0">
-                <a:latin typeface="Courier New" panose="02070309020205020404" pitchFamily="49" charset="0"/>
-                <a:cs typeface="Courier New" panose="02070309020205020404" pitchFamily="49" charset="0"/>
-              </a:rPr>
-              <a:t>:/gitHub/_</a:t>
-            </a:r>
-            <a:r>
-              <a:rPr lang="en-US" sz="1500" dirty="0" err="1">
-                <a:latin typeface="Courier New" panose="02070309020205020404" pitchFamily="49" charset="0"/>
-                <a:cs typeface="Courier New" panose="02070309020205020404" pitchFamily="49" charset="0"/>
-              </a:rPr>
-              <a:t>myApps</a:t>
-            </a:r>
-            <a:r>
-              <a:rPr lang="en-US" sz="1500" dirty="0">
-                <a:latin typeface="Courier New" panose="02070309020205020404" pitchFamily="49" charset="0"/>
-                <a:cs typeface="Courier New" panose="02070309020205020404" pitchFamily="49" charset="0"/>
-              </a:rPr>
-              <a:t>/</a:t>
-            </a:r>
-            <a:r>
-              <a:rPr lang="en-US" sz="1500" dirty="0" err="1">
-                <a:latin typeface="Courier New" panose="02070309020205020404" pitchFamily="49" charset="0"/>
-                <a:cs typeface="Courier New" panose="02070309020205020404" pitchFamily="49" charset="0"/>
-              </a:rPr>
-              <a:t>ai</a:t>
-            </a:r>
-            <a:r>
-              <a:rPr lang="en-US" sz="1500">
-                <a:latin typeface="Courier New" panose="02070309020205020404" pitchFamily="49" charset="0"/>
-                <a:cs typeface="Courier New" panose="02070309020205020404" pitchFamily="49" charset="0"/>
-              </a:rPr>
-              <a:t>-racing-league $ </a:t>
-            </a:r>
-            <a:r>
-              <a:rPr lang="en-US" sz="1500" b="1" dirty="0">
-                <a:latin typeface="Courier New" panose="02070309020205020404" pitchFamily="49" charset="0"/>
-                <a:cs typeface="Courier New" panose="02070309020205020404" pitchFamily="49" charset="0"/>
-              </a:rPr>
-              <a:t>git push</a:t>
-            </a:r>
-          </a:p>
-          <a:p>
-            <a:pPr marL="0" indent="0">
-              <a:buNone/>
-            </a:pPr>
-            <a:endParaRPr lang="en-US" dirty="0">
-              <a:latin typeface="Courier New" panose="02070309020205020404" pitchFamily="49" charset="0"/>
-              <a:cs typeface="Courier New" panose="02070309020205020404" pitchFamily="49" charset="0"/>
-            </a:endParaRPr>
-          </a:p>
-        </p:txBody>
-      </p:sp>
-    </p:spTree>
-    <p:extLst>
-      <p:ext uri="{BB962C8B-B14F-4D97-AF65-F5344CB8AC3E}">
-        <p14:creationId xmlns:p14="http://schemas.microsoft.com/office/powerpoint/2010/main" val="2904767785"/>
-      </p:ext>
-    </p:extLst>
-  </p:cSld>
-  <p:clrMapOvr>
-    <a:masterClrMapping/>
-  </p:clrMapOvr>
-</p:sld>
-</file>
-
-<file path=ppt/slides/slide11.xml><?xml version="1.0" encoding="utf-8"?>
-<p:sld xmlns:a="http://schemas.openxmlformats.org/drawingml/2006/main" xmlns:r="http://schemas.openxmlformats.org/officeDocument/2006/relationships" xmlns:p="http://schemas.openxmlformats.org/presentationml/2006/main">
-  <p:cSld>
-    <p:spTree>
-      <p:nvGrpSpPr>
-        <p:cNvPr id="1" name=""/>
-        <p:cNvGrpSpPr/>
-        <p:nvPr/>
-      </p:nvGrpSpPr>
-      <p:grpSpPr>
-        <a:xfrm>
-          <a:off x="0" y="0"/>
-          <a:ext cx="0" cy="0"/>
-          <a:chOff x="0" y="0"/>
-          <a:chExt cx="0" cy="0"/>
-        </a:xfrm>
-      </p:grpSpPr>
-      <p:sp>
-        <p:nvSpPr>
-          <p:cNvPr id="2" name="Title 1">
-            <a:extLst>
-              <a:ext uri="{FF2B5EF4-FFF2-40B4-BE49-F238E27FC236}">
-                <a16:creationId xmlns:a16="http://schemas.microsoft.com/office/drawing/2014/main" id="{35BE765F-EE8F-3B4A-A714-7D2A1BEDE03C}"/>
-              </a:ext>
-            </a:extLst>
-          </p:cNvPr>
-          <p:cNvSpPr>
-            <a:spLocks noGrp="1"/>
-          </p:cNvSpPr>
-          <p:nvPr>
-            <p:ph type="title"/>
-          </p:nvPr>
-        </p:nvSpPr>
-        <p:spPr/>
-        <p:txBody>
-          <a:bodyPr/>
-          <a:lstStyle/>
-          <a:p>
-            <a:pPr algn="ctr"/>
-            <a:r>
-              <a:rPr lang="en-US" dirty="0"/>
-              <a:t>Git – Some Useful Info</a:t>
-            </a:r>
-          </a:p>
-        </p:txBody>
-      </p:sp>
-      <p:sp>
-        <p:nvSpPr>
-          <p:cNvPr id="3" name="Content Placeholder 2">
-            <a:extLst>
-              <a:ext uri="{FF2B5EF4-FFF2-40B4-BE49-F238E27FC236}">
-                <a16:creationId xmlns:a16="http://schemas.microsoft.com/office/drawing/2014/main" id="{4D2CCB5E-5517-CA45-A3DC-E1C1500C22C2}"/>
-              </a:ext>
-            </a:extLst>
-          </p:cNvPr>
-          <p:cNvSpPr>
-            <a:spLocks noGrp="1"/>
-          </p:cNvSpPr>
-          <p:nvPr>
-            <p:ph idx="1"/>
-          </p:nvPr>
-        </p:nvSpPr>
-        <p:spPr/>
-        <p:txBody>
-          <a:bodyPr/>
-          <a:lstStyle/>
-          <a:p>
-            <a:r>
-              <a:rPr lang="en-US" dirty="0">
-                <a:hlinkClick r:id="rId2"/>
-              </a:rPr>
-              <a:t>https://gist.github.com/arttuladhar/5887559</a:t>
-            </a:r>
-            <a:endParaRPr lang="en-US" dirty="0"/>
-          </a:p>
-          <a:p>
-            <a:r>
-              <a:rPr lang="en-US" dirty="0">
-                <a:hlinkClick r:id="rId3"/>
-              </a:rPr>
-              <a:t>https://gist.github.com/jedmao/5053440</a:t>
-            </a:r>
-            <a:endParaRPr lang="en-US" dirty="0"/>
-          </a:p>
-          <a:p>
-            <a:r>
-              <a:rPr lang="en-US" dirty="0">
-                <a:hlinkClick r:id="rId4"/>
-              </a:rPr>
-              <a:t>https://git-scm.com/docs</a:t>
-            </a:r>
-            <a:endParaRPr lang="en-US" dirty="0"/>
-          </a:p>
-          <a:p>
-            <a:r>
-              <a:rPr lang="en-US" dirty="0">
-                <a:hlinkClick r:id="rId5"/>
-              </a:rPr>
-              <a:t>https://www.atlassian.com/git/tutorials</a:t>
-            </a:r>
-          </a:p>
-          <a:p>
-            <a:r>
-              <a:rPr lang="en-US" dirty="0">
-                <a:hlinkClick r:id="rId5"/>
-              </a:rPr>
-              <a:t>www.google.com</a:t>
-            </a:r>
-            <a:endParaRPr lang="en-US"/>
-          </a:p>
-          <a:p>
-            <a:endParaRPr lang="en-US" dirty="0"/>
-          </a:p>
-          <a:p>
-            <a:endParaRPr lang="en-US" dirty="0"/>
-          </a:p>
-          <a:p>
-            <a:endParaRPr lang="en-US" dirty="0"/>
-          </a:p>
-          <a:p>
-            <a:endParaRPr lang="en-US" dirty="0"/>
-          </a:p>
-        </p:txBody>
-      </p:sp>
-    </p:spTree>
-    <p:extLst>
-      <p:ext uri="{BB962C8B-B14F-4D97-AF65-F5344CB8AC3E}">
-        <p14:creationId xmlns:p14="http://schemas.microsoft.com/office/powerpoint/2010/main" val="1357035687"/>
-      </p:ext>
-    </p:extLst>
-  </p:cSld>
-  <p:clrMapOvr>
-    <a:masterClrMapping/>
-  </p:clrMapOvr>
-</p:sld>
-</file>
-
-<file path=ppt/slides/slide2.xml><?xml version="1.0" encoding="utf-8"?>
+<file path=ppt/slides/slide3.xml><?xml version="1.0" encoding="utf-8"?>
 <p:sld xmlns:a="http://schemas.openxmlformats.org/drawingml/2006/main" xmlns:r="http://schemas.openxmlformats.org/officeDocument/2006/relationships" xmlns:p="http://schemas.openxmlformats.org/presentationml/2006/main">
   <p:cSld>
     <p:spTree>
@@ -4972,7 +6226,7 @@
 </p:sld>
 </file>
 
-<file path=ppt/slides/slide3.xml><?xml version="1.0" encoding="utf-8"?>
+<file path=ppt/slides/slide4.xml><?xml version="1.0" encoding="utf-8"?>
 <p:sld xmlns:a="http://schemas.openxmlformats.org/drawingml/2006/main" xmlns:r="http://schemas.openxmlformats.org/officeDocument/2006/relationships" xmlns:p="http://schemas.openxmlformats.org/presentationml/2006/main">
   <p:cSld>
     <p:spTree>
@@ -5165,7 +6419,7 @@
 </p:sld>
 </file>
 
-<file path=ppt/slides/slide4.xml><?xml version="1.0" encoding="utf-8"?>
+<file path=ppt/slides/slide5.xml><?xml version="1.0" encoding="utf-8"?>
 <p:sld xmlns:a="http://schemas.openxmlformats.org/drawingml/2006/main" xmlns:r="http://schemas.openxmlformats.org/officeDocument/2006/relationships" xmlns:p="http://schemas.openxmlformats.org/presentationml/2006/main">
   <p:cSld>
     <p:spTree>
@@ -5296,7 +6550,7 @@
 </p:sld>
 </file>
 
-<file path=ppt/slides/slide5.xml><?xml version="1.0" encoding="utf-8"?>
+<file path=ppt/slides/slide6.xml><?xml version="1.0" encoding="utf-8"?>
 <p:sld xmlns:a="http://schemas.openxmlformats.org/drawingml/2006/main" xmlns:r="http://schemas.openxmlformats.org/officeDocument/2006/relationships" xmlns:p="http://schemas.openxmlformats.org/presentationml/2006/main">
   <p:cSld>
     <p:spTree>
@@ -5432,7 +6686,7 @@
 </p:sld>
 </file>
 
-<file path=ppt/slides/slide6.xml><?xml version="1.0" encoding="utf-8"?>
+<file path=ppt/slides/slide7.xml><?xml version="1.0" encoding="utf-8"?>
 <p:sld xmlns:a="http://schemas.openxmlformats.org/drawingml/2006/main" xmlns:r="http://schemas.openxmlformats.org/officeDocument/2006/relationships" xmlns:p="http://schemas.openxmlformats.org/presentationml/2006/main">
   <p:cSld>
     <p:spTree>
@@ -5563,112 +6817,6 @@
 </p:sld>
 </file>
 
-<file path=ppt/slides/slide7.xml><?xml version="1.0" encoding="utf-8"?>
-<p:sld xmlns:a="http://schemas.openxmlformats.org/drawingml/2006/main" xmlns:r="http://schemas.openxmlformats.org/officeDocument/2006/relationships" xmlns:p="http://schemas.openxmlformats.org/presentationml/2006/main">
-  <p:cSld>
-    <p:spTree>
-      <p:nvGrpSpPr>
-        <p:cNvPr id="1" name=""/>
-        <p:cNvGrpSpPr/>
-        <p:nvPr/>
-      </p:nvGrpSpPr>
-      <p:grpSpPr>
-        <a:xfrm>
-          <a:off x="0" y="0"/>
-          <a:ext cx="0" cy="0"/>
-          <a:chOff x="0" y="0"/>
-          <a:chExt cx="0" cy="0"/>
-        </a:xfrm>
-      </p:grpSpPr>
-      <p:sp>
-        <p:nvSpPr>
-          <p:cNvPr id="2" name="Title 1">
-            <a:extLst>
-              <a:ext uri="{FF2B5EF4-FFF2-40B4-BE49-F238E27FC236}">
-                <a16:creationId xmlns:a16="http://schemas.microsoft.com/office/drawing/2014/main" id="{35BE765F-EE8F-3B4A-A714-7D2A1BEDE03C}"/>
-              </a:ext>
-            </a:extLst>
-          </p:cNvPr>
-          <p:cNvSpPr>
-            <a:spLocks noGrp="1"/>
-          </p:cNvSpPr>
-          <p:nvPr>
-            <p:ph type="title"/>
-          </p:nvPr>
-        </p:nvSpPr>
-        <p:spPr/>
-        <p:txBody>
-          <a:bodyPr/>
-          <a:lstStyle/>
-          <a:p>
-            <a:pPr algn="ctr"/>
-            <a:r>
-              <a:rPr lang="en-US" dirty="0"/>
-              <a:t>GitHub – Quick and Dirty Changes</a:t>
-            </a:r>
-          </a:p>
-        </p:txBody>
-      </p:sp>
-      <p:sp>
-        <p:nvSpPr>
-          <p:cNvPr id="3" name="Content Placeholder 2">
-            <a:extLst>
-              <a:ext uri="{FF2B5EF4-FFF2-40B4-BE49-F238E27FC236}">
-                <a16:creationId xmlns:a16="http://schemas.microsoft.com/office/drawing/2014/main" id="{4D2CCB5E-5517-CA45-A3DC-E1C1500C22C2}"/>
-              </a:ext>
-            </a:extLst>
-          </p:cNvPr>
-          <p:cNvSpPr>
-            <a:spLocks noGrp="1"/>
-          </p:cNvSpPr>
-          <p:nvPr>
-            <p:ph idx="1"/>
-          </p:nvPr>
-        </p:nvSpPr>
-        <p:spPr/>
-        <p:txBody>
-          <a:bodyPr/>
-          <a:lstStyle/>
-          <a:p>
-            <a:r>
-              <a:rPr lang="en-US" dirty="0"/>
-              <a:t>The best way is to clone the code and work on your own computer</a:t>
-            </a:r>
-          </a:p>
-          <a:p>
-            <a:r>
-              <a:rPr lang="en-US" dirty="0"/>
-              <a:t>But for quick and dirty changes, you can change it on GitHub directly</a:t>
-            </a:r>
-          </a:p>
-          <a:p>
-            <a:endParaRPr lang="en-US" dirty="0"/>
-          </a:p>
-          <a:p>
-            <a:pPr marL="0" indent="0">
-              <a:buNone/>
-            </a:pPr>
-            <a:endParaRPr lang="en-US" dirty="0"/>
-          </a:p>
-          <a:p>
-            <a:pPr lvl="1"/>
-            <a:endParaRPr lang="en-US" dirty="0"/>
-          </a:p>
-        </p:txBody>
-      </p:sp>
-    </p:spTree>
-    <p:extLst>
-      <p:ext uri="{BB962C8B-B14F-4D97-AF65-F5344CB8AC3E}">
-        <p14:creationId xmlns:p14="http://schemas.microsoft.com/office/powerpoint/2010/main" val="2075310499"/>
-      </p:ext>
-    </p:extLst>
-  </p:cSld>
-  <p:clrMapOvr>
-    <a:masterClrMapping/>
-  </p:clrMapOvr>
-</p:sld>
-</file>
-
 <file path=ppt/slides/slide8.xml><?xml version="1.0" encoding="utf-8"?>
 <p:sld xmlns:a="http://schemas.openxmlformats.org/drawingml/2006/main" xmlns:r="http://schemas.openxmlformats.org/officeDocument/2006/relationships" xmlns:p="http://schemas.openxmlformats.org/presentationml/2006/main">
   <p:cSld>
@@ -5688,6 +6836,35 @@
       </p:grpSpPr>
       <p:sp>
         <p:nvSpPr>
+          <p:cNvPr id="2" name="Title 1">
+            <a:extLst>
+              <a:ext uri="{FF2B5EF4-FFF2-40B4-BE49-F238E27FC236}">
+                <a16:creationId xmlns:a16="http://schemas.microsoft.com/office/drawing/2014/main" id="{35BE765F-EE8F-3B4A-A714-7D2A1BEDE03C}"/>
+              </a:ext>
+            </a:extLst>
+          </p:cNvPr>
+          <p:cNvSpPr>
+            <a:spLocks noGrp="1"/>
+          </p:cNvSpPr>
+          <p:nvPr>
+            <p:ph type="title"/>
+          </p:nvPr>
+        </p:nvSpPr>
+        <p:spPr/>
+        <p:txBody>
+          <a:bodyPr/>
+          <a:lstStyle/>
+          <a:p>
+            <a:pPr algn="ctr"/>
+            <a:r>
+              <a:rPr lang="en-US" dirty="0"/>
+              <a:t>GitHub – Quick and Dirty Changes</a:t>
+            </a:r>
+          </a:p>
+        </p:txBody>
+      </p:sp>
+      <p:sp>
+        <p:nvSpPr>
           <p:cNvPr id="3" name="Content Placeholder 2">
             <a:extLst>
               <a:ext uri="{FF2B5EF4-FFF2-40B4-BE49-F238E27FC236}">
@@ -5702,95 +6879,41 @@
             <p:ph idx="1"/>
           </p:nvPr>
         </p:nvSpPr>
-        <p:spPr>
-          <a:xfrm>
-            <a:off x="838200" y="555585"/>
-            <a:ext cx="10515600" cy="5621378"/>
-          </a:xfrm>
-        </p:spPr>
-        <p:txBody>
-          <a:bodyPr>
-            <a:normAutofit/>
-          </a:bodyPr>
+        <p:spPr/>
+        <p:txBody>
+          <a:bodyPr/>
           <a:lstStyle/>
           <a:p>
-            <a:pPr marL="457200" lvl="1" indent="0">
+            <a:r>
+              <a:rPr lang="en-US" dirty="0"/>
+              <a:t>The best way is to clone the code and work on your own computer</a:t>
+            </a:r>
+          </a:p>
+          <a:p>
+            <a:r>
+              <a:rPr lang="en-US" dirty="0"/>
+              <a:t>But for quick and dirty changes, you can change it on GitHub directly</a:t>
+            </a:r>
+          </a:p>
+          <a:p>
+            <a:endParaRPr lang="en-US" dirty="0"/>
+          </a:p>
+          <a:p>
+            <a:pPr marL="0" indent="0">
               <a:buNone/>
             </a:pPr>
             <a:endParaRPr lang="en-US" dirty="0"/>
           </a:p>
           <a:p>
-            <a:pPr marL="457200" lvl="1" indent="0">
-              <a:buNone/>
-            </a:pPr>
+            <a:pPr lvl="1"/>
             <a:endParaRPr lang="en-US" dirty="0"/>
           </a:p>
         </p:txBody>
       </p:sp>
-      <p:pic>
-        <p:nvPicPr>
-          <p:cNvPr id="4" name="Picture 3">
-            <a:extLst>
-              <a:ext uri="{FF2B5EF4-FFF2-40B4-BE49-F238E27FC236}">
-                <a16:creationId xmlns:a16="http://schemas.microsoft.com/office/drawing/2014/main" id="{3A474BE0-2264-CC4A-A715-A50E027BE6FC}"/>
-              </a:ext>
-            </a:extLst>
-          </p:cNvPr>
-          <p:cNvPicPr>
-            <a:picLocks noChangeAspect="1"/>
-          </p:cNvPicPr>
-          <p:nvPr/>
-        </p:nvPicPr>
-        <p:blipFill>
-          <a:blip r:embed="rId2"/>
-          <a:stretch>
-            <a:fillRect/>
-          </a:stretch>
-        </p:blipFill>
-        <p:spPr>
-          <a:xfrm>
-            <a:off x="190917" y="0"/>
-            <a:ext cx="6036012" cy="1945341"/>
-          </a:xfrm>
-          <a:prstGeom prst="rect">
-            <a:avLst/>
-          </a:prstGeom>
-        </p:spPr>
-      </p:pic>
-      <p:pic>
-        <p:nvPicPr>
-          <p:cNvPr id="6" name="Picture 5">
-            <a:extLst>
-              <a:ext uri="{FF2B5EF4-FFF2-40B4-BE49-F238E27FC236}">
-                <a16:creationId xmlns:a16="http://schemas.microsoft.com/office/drawing/2014/main" id="{D96BB021-57ED-724E-9CB9-6A2E1E4C7FC7}"/>
-              </a:ext>
-            </a:extLst>
-          </p:cNvPr>
-          <p:cNvPicPr>
-            <a:picLocks noChangeAspect="1"/>
-          </p:cNvPicPr>
-          <p:nvPr/>
-        </p:nvPicPr>
-        <p:blipFill>
-          <a:blip r:embed="rId3"/>
-          <a:stretch>
-            <a:fillRect/>
-          </a:stretch>
-        </p:blipFill>
-        <p:spPr>
-          <a:xfrm>
-            <a:off x="6546893" y="0"/>
-            <a:ext cx="5573389" cy="6858000"/>
-          </a:xfrm>
-          <a:prstGeom prst="rect">
-            <a:avLst/>
-          </a:prstGeom>
-        </p:spPr>
-      </p:pic>
     </p:spTree>
     <p:extLst>
       <p:ext uri="{BB962C8B-B14F-4D97-AF65-F5344CB8AC3E}">
-        <p14:creationId xmlns:p14="http://schemas.microsoft.com/office/powerpoint/2010/main" val="4135078519"/>
+        <p14:creationId xmlns:p14="http://schemas.microsoft.com/office/powerpoint/2010/main" val="2075310499"/>
       </p:ext>
     </p:extLst>
   </p:cSld>
@@ -5819,163 +6942,109 @@
       </p:grpSpPr>
       <p:sp>
         <p:nvSpPr>
-          <p:cNvPr id="2" name="Title 1">
-            <a:extLst>
-              <a:ext uri="{FF2B5EF4-FFF2-40B4-BE49-F238E27FC236}">
-                <a16:creationId xmlns:a16="http://schemas.microsoft.com/office/drawing/2014/main" id="{35BE765F-EE8F-3B4A-A714-7D2A1BEDE03C}"/>
-              </a:ext>
-            </a:extLst>
-          </p:cNvPr>
-          <p:cNvSpPr>
-            <a:spLocks noGrp="1"/>
-          </p:cNvSpPr>
-          <p:nvPr>
-            <p:ph type="title"/>
-          </p:nvPr>
-        </p:nvSpPr>
-        <p:spPr/>
-        <p:txBody>
-          <a:bodyPr/>
+          <p:cNvPr id="3" name="Content Placeholder 2">
+            <a:extLst>
+              <a:ext uri="{FF2B5EF4-FFF2-40B4-BE49-F238E27FC236}">
+                <a16:creationId xmlns:a16="http://schemas.microsoft.com/office/drawing/2014/main" id="{4D2CCB5E-5517-CA45-A3DC-E1C1500C22C2}"/>
+              </a:ext>
+            </a:extLst>
+          </p:cNvPr>
+          <p:cNvSpPr>
+            <a:spLocks noGrp="1"/>
+          </p:cNvSpPr>
+          <p:nvPr>
+            <p:ph idx="1"/>
+          </p:nvPr>
+        </p:nvSpPr>
+        <p:spPr>
+          <a:xfrm>
+            <a:off x="838200" y="555585"/>
+            <a:ext cx="10515600" cy="5621378"/>
+          </a:xfrm>
+        </p:spPr>
+        <p:txBody>
+          <a:bodyPr>
+            <a:normAutofit/>
+          </a:bodyPr>
           <a:lstStyle/>
           <a:p>
-            <a:pPr algn="ctr"/>
-            <a:r>
-              <a:rPr lang="en-US" dirty="0"/>
-              <a:t>Git – work on your own computer</a:t>
-            </a:r>
-          </a:p>
-        </p:txBody>
-      </p:sp>
-      <p:sp>
-        <p:nvSpPr>
-          <p:cNvPr id="3" name="Content Placeholder 2">
-            <a:extLst>
-              <a:ext uri="{FF2B5EF4-FFF2-40B4-BE49-F238E27FC236}">
-                <a16:creationId xmlns:a16="http://schemas.microsoft.com/office/drawing/2014/main" id="{4D2CCB5E-5517-CA45-A3DC-E1C1500C22C2}"/>
-              </a:ext>
-            </a:extLst>
-          </p:cNvPr>
-          <p:cNvSpPr>
-            <a:spLocks noGrp="1"/>
-          </p:cNvSpPr>
-          <p:nvPr>
-            <p:ph idx="1"/>
-          </p:nvPr>
-        </p:nvSpPr>
-        <p:spPr/>
-        <p:txBody>
-          <a:bodyPr/>
-          <a:lstStyle/>
-          <a:p>
-            <a:r>
-              <a:rPr lang="en-US" sz="2400" b="1" dirty="0">
-                <a:latin typeface="Courier New" panose="02070309020205020404" pitchFamily="49" charset="0"/>
-                <a:cs typeface="Courier New" panose="02070309020205020404" pitchFamily="49" charset="0"/>
-              </a:rPr>
-              <a:t>git clone</a:t>
-            </a:r>
-            <a:r>
-              <a:rPr lang="en-US" sz="2400" dirty="0"/>
-              <a:t>: make a copy of the source code to your computer</a:t>
-            </a:r>
-          </a:p>
-          <a:p>
-            <a:pPr lvl="1"/>
-            <a:r>
-              <a:rPr lang="en-US" dirty="0"/>
-              <a:t>If you are new to gitHub, just work on the master branch, otherwise</a:t>
-            </a:r>
-          </a:p>
-          <a:p>
-            <a:pPr lvl="1"/>
-            <a:r>
-              <a:rPr lang="en-US" sz="2000" b="1" dirty="0">
-                <a:latin typeface="Courier New" panose="02070309020205020404" pitchFamily="49" charset="0"/>
-                <a:cs typeface="Courier New" panose="02070309020205020404" pitchFamily="49" charset="0"/>
-              </a:rPr>
-              <a:t>git branch</a:t>
-            </a:r>
-            <a:r>
-              <a:rPr lang="en-US" sz="2000" dirty="0"/>
-              <a:t>: make yet another copy of the source code on your computer</a:t>
-            </a:r>
-          </a:p>
-          <a:p>
-            <a:pPr lvl="1"/>
-            <a:r>
-              <a:rPr lang="en-US" sz="2000" b="1" dirty="0">
-                <a:latin typeface="Courier New" panose="02070309020205020404" pitchFamily="49" charset="0"/>
-                <a:cs typeface="Courier New" panose="02070309020205020404" pitchFamily="49" charset="0"/>
-              </a:rPr>
-              <a:t>git checkout</a:t>
-            </a:r>
-            <a:r>
-              <a:rPr lang="en-US" sz="2000" dirty="0"/>
-              <a:t>: switch to the branch to work on it  </a:t>
-            </a:r>
-          </a:p>
-          <a:p>
-            <a:r>
-              <a:rPr lang="en-US" sz="2400" dirty="0"/>
-              <a:t>…. edit your code using vi or your favorite IDE</a:t>
-            </a:r>
-          </a:p>
-          <a:p>
-            <a:r>
-              <a:rPr lang="en-US" sz="2400" b="1" dirty="0">
-                <a:latin typeface="Courier New" panose="02070309020205020404" pitchFamily="49" charset="0"/>
-                <a:cs typeface="Courier New" panose="02070309020205020404" pitchFamily="49" charset="0"/>
-              </a:rPr>
-              <a:t>git add</a:t>
-            </a:r>
-            <a:r>
-              <a:rPr lang="en-US" sz="2400" dirty="0"/>
-              <a:t>: add the changes you make to git to be tracked</a:t>
-            </a:r>
-          </a:p>
-          <a:p>
-            <a:r>
-              <a:rPr lang="en-US" sz="2400" b="1" dirty="0">
-                <a:latin typeface="Courier New" panose="02070309020205020404" pitchFamily="49" charset="0"/>
-                <a:cs typeface="Courier New" panose="02070309020205020404" pitchFamily="49" charset="0"/>
-              </a:rPr>
-              <a:t>git commit</a:t>
-            </a:r>
-            <a:r>
-              <a:rPr lang="en-US" sz="2400" dirty="0"/>
-              <a:t>: commit changes to your local repository</a:t>
-            </a:r>
-          </a:p>
-          <a:p>
-            <a:r>
-              <a:rPr lang="en-US" sz="2400" b="1" dirty="0">
-                <a:latin typeface="Courier New" panose="02070309020205020404" pitchFamily="49" charset="0"/>
-                <a:cs typeface="Courier New" panose="02070309020205020404" pitchFamily="49" charset="0"/>
-              </a:rPr>
-              <a:t>git push</a:t>
-            </a:r>
-            <a:r>
-              <a:rPr lang="en-US" sz="2400" dirty="0"/>
-              <a:t>: push your changes to your </a:t>
-            </a:r>
-            <a:r>
-              <a:rPr lang="en-US" sz="2400" dirty="0" err="1"/>
-              <a:t>github</a:t>
-            </a:r>
-            <a:r>
-              <a:rPr lang="en-US" sz="2400" dirty="0"/>
-              <a:t> fork</a:t>
-            </a:r>
-          </a:p>
-          <a:p>
+            <a:pPr marL="457200" lvl="1" indent="0">
+              <a:buNone/>
+            </a:pPr>
             <a:endParaRPr lang="en-US" dirty="0"/>
           </a:p>
-        </p:txBody>
-      </p:sp>
+          <a:p>
+            <a:pPr marL="457200" lvl="1" indent="0">
+              <a:buNone/>
+            </a:pPr>
+            <a:endParaRPr lang="en-US" dirty="0"/>
+          </a:p>
+        </p:txBody>
+      </p:sp>
+      <p:pic>
+        <p:nvPicPr>
+          <p:cNvPr id="4" name="Picture 3">
+            <a:extLst>
+              <a:ext uri="{FF2B5EF4-FFF2-40B4-BE49-F238E27FC236}">
+                <a16:creationId xmlns:a16="http://schemas.microsoft.com/office/drawing/2014/main" id="{3A474BE0-2264-CC4A-A715-A50E027BE6FC}"/>
+              </a:ext>
+            </a:extLst>
+          </p:cNvPr>
+          <p:cNvPicPr>
+            <a:picLocks noChangeAspect="1"/>
+          </p:cNvPicPr>
+          <p:nvPr/>
+        </p:nvPicPr>
+        <p:blipFill>
+          <a:blip r:embed="rId2"/>
+          <a:stretch>
+            <a:fillRect/>
+          </a:stretch>
+        </p:blipFill>
+        <p:spPr>
+          <a:xfrm>
+            <a:off x="190917" y="0"/>
+            <a:ext cx="6036012" cy="1945341"/>
+          </a:xfrm>
+          <a:prstGeom prst="rect">
+            <a:avLst/>
+          </a:prstGeom>
+        </p:spPr>
+      </p:pic>
+      <p:pic>
+        <p:nvPicPr>
+          <p:cNvPr id="6" name="Picture 5">
+            <a:extLst>
+              <a:ext uri="{FF2B5EF4-FFF2-40B4-BE49-F238E27FC236}">
+                <a16:creationId xmlns:a16="http://schemas.microsoft.com/office/drawing/2014/main" id="{D96BB021-57ED-724E-9CB9-6A2E1E4C7FC7}"/>
+              </a:ext>
+            </a:extLst>
+          </p:cNvPr>
+          <p:cNvPicPr>
+            <a:picLocks noChangeAspect="1"/>
+          </p:cNvPicPr>
+          <p:nvPr/>
+        </p:nvPicPr>
+        <p:blipFill>
+          <a:blip r:embed="rId3"/>
+          <a:stretch>
+            <a:fillRect/>
+          </a:stretch>
+        </p:blipFill>
+        <p:spPr>
+          <a:xfrm>
+            <a:off x="6546893" y="0"/>
+            <a:ext cx="5573389" cy="6858000"/>
+          </a:xfrm>
+          <a:prstGeom prst="rect">
+            <a:avLst/>
+          </a:prstGeom>
+        </p:spPr>
+      </p:pic>
     </p:spTree>
     <p:extLst>
       <p:ext uri="{BB962C8B-B14F-4D97-AF65-F5344CB8AC3E}">
-        <p14:creationId xmlns:p14="http://schemas.microsoft.com/office/powerpoint/2010/main" val="808685095"/>
+        <p14:creationId xmlns:p14="http://schemas.microsoft.com/office/powerpoint/2010/main" val="4135078519"/>
       </p:ext>
     </p:extLst>
   </p:cSld>
@@ -6278,4 +7347,299 @@
     </a:ext>
   </a:extLst>
 </a:theme>
+</file>
+
+<file path=ppt/theme/theme2.xml><?xml version="1.0" encoding="utf-8"?>
+<a:theme xmlns:a="http://schemas.openxmlformats.org/drawingml/2006/main" name="Office Theme">
+  <a:themeElements>
+    <a:clrScheme name="Office">
+      <a:dk1>
+        <a:sysClr val="windowText" lastClr="000000"/>
+      </a:dk1>
+      <a:lt1>
+        <a:sysClr val="window" lastClr="FFFFFF"/>
+      </a:lt1>
+      <a:dk2>
+        <a:srgbClr val="44546A"/>
+      </a:dk2>
+      <a:lt2>
+        <a:srgbClr val="E7E6E6"/>
+      </a:lt2>
+      <a:accent1>
+        <a:srgbClr val="4472C4"/>
+      </a:accent1>
+      <a:accent2>
+        <a:srgbClr val="ED7D31"/>
+      </a:accent2>
+      <a:accent3>
+        <a:srgbClr val="A5A5A5"/>
+      </a:accent3>
+      <a:accent4>
+        <a:srgbClr val="FFC000"/>
+      </a:accent4>
+      <a:accent5>
+        <a:srgbClr val="5B9BD5"/>
+      </a:accent5>
+      <a:accent6>
+        <a:srgbClr val="70AD47"/>
+      </a:accent6>
+      <a:hlink>
+        <a:srgbClr val="0563C1"/>
+      </a:hlink>
+      <a:folHlink>
+        <a:srgbClr val="954F72"/>
+      </a:folHlink>
+    </a:clrScheme>
+    <a:fontScheme name="Office">
+      <a:majorFont>
+        <a:latin typeface="Calibri Light" panose="020F0302020204030204"/>
+        <a:ea typeface=""/>
+        <a:cs typeface=""/>
+        <a:font script="Jpan" typeface="游ゴシック Light"/>
+        <a:font script="Hang" typeface="맑은 고딕"/>
+        <a:font script="Hans" typeface="等线 Light"/>
+        <a:font script="Hant" typeface="新細明體"/>
+        <a:font script="Arab" typeface="Times New Roman"/>
+        <a:font script="Hebr" typeface="Times New Roman"/>
+        <a:font script="Thai" typeface="Angsana New"/>
+        <a:font script="Ethi" typeface="Nyala"/>
+        <a:font script="Beng" typeface="Vrinda"/>
+        <a:font script="Gujr" typeface="Shruti"/>
+        <a:font script="Khmr" typeface="MoolBoran"/>
+        <a:font script="Knda" typeface="Tunga"/>
+        <a:font script="Guru" typeface="Raavi"/>
+        <a:font script="Cans" typeface="Euphemia"/>
+        <a:font script="Cher" typeface="Plantagenet Cherokee"/>
+        <a:font script="Yiii" typeface="Microsoft Yi Baiti"/>
+        <a:font script="Tibt" typeface="Microsoft Himalaya"/>
+        <a:font script="Thaa" typeface="MV Boli"/>
+        <a:font script="Deva" typeface="Mangal"/>
+        <a:font script="Telu" typeface="Gautami"/>
+        <a:font script="Taml" typeface="Latha"/>
+        <a:font script="Syrc" typeface="Estrangelo Edessa"/>
+        <a:font script="Orya" typeface="Kalinga"/>
+        <a:font script="Mlym" typeface="Kartika"/>
+        <a:font script="Laoo" typeface="DokChampa"/>
+        <a:font script="Sinh" typeface="Iskoola Pota"/>
+        <a:font script="Mong" typeface="Mongolian Baiti"/>
+        <a:font script="Viet" typeface="Times New Roman"/>
+        <a:font script="Uigh" typeface="Microsoft Uighur"/>
+        <a:font script="Geor" typeface="Sylfaen"/>
+        <a:font script="Armn" typeface="Arial"/>
+        <a:font script="Bugi" typeface="Leelawadee UI"/>
+        <a:font script="Bopo" typeface="Microsoft JhengHei"/>
+        <a:font script="Java" typeface="Javanese Text"/>
+        <a:font script="Lisu" typeface="Segoe UI"/>
+        <a:font script="Mymr" typeface="Myanmar Text"/>
+        <a:font script="Nkoo" typeface="Ebrima"/>
+        <a:font script="Olck" typeface="Nirmala UI"/>
+        <a:font script="Osma" typeface="Ebrima"/>
+        <a:font script="Phag" typeface="Phagspa"/>
+        <a:font script="Syrn" typeface="Estrangelo Edessa"/>
+        <a:font script="Syrj" typeface="Estrangelo Edessa"/>
+        <a:font script="Syre" typeface="Estrangelo Edessa"/>
+        <a:font script="Sora" typeface="Nirmala UI"/>
+        <a:font script="Tale" typeface="Microsoft Tai Le"/>
+        <a:font script="Talu" typeface="Microsoft New Tai Lue"/>
+        <a:font script="Tfng" typeface="Ebrima"/>
+      </a:majorFont>
+      <a:minorFont>
+        <a:latin typeface="Calibri" panose="020F0502020204030204"/>
+        <a:ea typeface=""/>
+        <a:cs typeface=""/>
+        <a:font script="Jpan" typeface="游ゴシック"/>
+        <a:font script="Hang" typeface="맑은 고딕"/>
+        <a:font script="Hans" typeface="等线"/>
+        <a:font script="Hant" typeface="新細明體"/>
+        <a:font script="Arab" typeface="Arial"/>
+        <a:font script="Hebr" typeface="Arial"/>
+        <a:font script="Thai" typeface="Cordia New"/>
+        <a:font script="Ethi" typeface="Nyala"/>
+        <a:font script="Beng" typeface="Vrinda"/>
+        <a:font script="Gujr" typeface="Shruti"/>
+        <a:font script="Khmr" typeface="DaunPenh"/>
+        <a:font script="Knda" typeface="Tunga"/>
+        <a:font script="Guru" typeface="Raavi"/>
+        <a:font script="Cans" typeface="Euphemia"/>
+        <a:font script="Cher" typeface="Plantagenet Cherokee"/>
+        <a:font script="Yiii" typeface="Microsoft Yi Baiti"/>
+        <a:font script="Tibt" typeface="Microsoft Himalaya"/>
+        <a:font script="Thaa" typeface="MV Boli"/>
+        <a:font script="Deva" typeface="Mangal"/>
+        <a:font script="Telu" typeface="Gautami"/>
+        <a:font script="Taml" typeface="Latha"/>
+        <a:font script="Syrc" typeface="Estrangelo Edessa"/>
+        <a:font script="Orya" typeface="Kalinga"/>
+        <a:font script="Mlym" typeface="Kartika"/>
+        <a:font script="Laoo" typeface="DokChampa"/>
+        <a:font script="Sinh" typeface="Iskoola Pota"/>
+        <a:font script="Mong" typeface="Mongolian Baiti"/>
+        <a:font script="Viet" typeface="Arial"/>
+        <a:font script="Uigh" typeface="Microsoft Uighur"/>
+        <a:font script="Geor" typeface="Sylfaen"/>
+        <a:font script="Armn" typeface="Arial"/>
+        <a:font script="Bugi" typeface="Leelawadee UI"/>
+        <a:font script="Bopo" typeface="Microsoft JhengHei"/>
+        <a:font script="Java" typeface="Javanese Text"/>
+        <a:font script="Lisu" typeface="Segoe UI"/>
+        <a:font script="Mymr" typeface="Myanmar Text"/>
+        <a:font script="Nkoo" typeface="Ebrima"/>
+        <a:font script="Olck" typeface="Nirmala UI"/>
+        <a:font script="Osma" typeface="Ebrima"/>
+        <a:font script="Phag" typeface="Phagspa"/>
+        <a:font script="Syrn" typeface="Estrangelo Edessa"/>
+        <a:font script="Syrj" typeface="Estrangelo Edessa"/>
+        <a:font script="Syre" typeface="Estrangelo Edessa"/>
+        <a:font script="Sora" typeface="Nirmala UI"/>
+        <a:font script="Tale" typeface="Microsoft Tai Le"/>
+        <a:font script="Talu" typeface="Microsoft New Tai Lue"/>
+        <a:font script="Tfng" typeface="Ebrima"/>
+      </a:minorFont>
+    </a:fontScheme>
+    <a:fmtScheme name="Office">
+      <a:fillStyleLst>
+        <a:solidFill>
+          <a:schemeClr val="phClr"/>
+        </a:solidFill>
+        <a:gradFill rotWithShape="1">
+          <a:gsLst>
+            <a:gs pos="0">
+              <a:schemeClr val="phClr">
+                <a:lumMod val="110000"/>
+                <a:satMod val="105000"/>
+                <a:tint val="67000"/>
+              </a:schemeClr>
+            </a:gs>
+            <a:gs pos="50000">
+              <a:schemeClr val="phClr">
+                <a:lumMod val="105000"/>
+                <a:satMod val="103000"/>
+                <a:tint val="73000"/>
+              </a:schemeClr>
+            </a:gs>
+            <a:gs pos="100000">
+              <a:schemeClr val="phClr">
+                <a:lumMod val="105000"/>
+                <a:satMod val="109000"/>
+                <a:tint val="81000"/>
+              </a:schemeClr>
+            </a:gs>
+          </a:gsLst>
+          <a:lin ang="5400000" scaled="0"/>
+        </a:gradFill>
+        <a:gradFill rotWithShape="1">
+          <a:gsLst>
+            <a:gs pos="0">
+              <a:schemeClr val="phClr">
+                <a:satMod val="103000"/>
+                <a:lumMod val="102000"/>
+                <a:tint val="94000"/>
+              </a:schemeClr>
+            </a:gs>
+            <a:gs pos="50000">
+              <a:schemeClr val="phClr">
+                <a:satMod val="110000"/>
+                <a:lumMod val="100000"/>
+                <a:shade val="100000"/>
+              </a:schemeClr>
+            </a:gs>
+            <a:gs pos="100000">
+              <a:schemeClr val="phClr">
+                <a:lumMod val="99000"/>
+                <a:satMod val="120000"/>
+                <a:shade val="78000"/>
+              </a:schemeClr>
+            </a:gs>
+          </a:gsLst>
+          <a:lin ang="5400000" scaled="0"/>
+        </a:gradFill>
+      </a:fillStyleLst>
+      <a:lnStyleLst>
+        <a:ln w="6350" cap="flat" cmpd="sng" algn="ctr">
+          <a:solidFill>
+            <a:schemeClr val="phClr"/>
+          </a:solidFill>
+          <a:prstDash val="solid"/>
+          <a:miter lim="800000"/>
+        </a:ln>
+        <a:ln w="12700" cap="flat" cmpd="sng" algn="ctr">
+          <a:solidFill>
+            <a:schemeClr val="phClr"/>
+          </a:solidFill>
+          <a:prstDash val="solid"/>
+          <a:miter lim="800000"/>
+        </a:ln>
+        <a:ln w="19050" cap="flat" cmpd="sng" algn="ctr">
+          <a:solidFill>
+            <a:schemeClr val="phClr"/>
+          </a:solidFill>
+          <a:prstDash val="solid"/>
+          <a:miter lim="800000"/>
+        </a:ln>
+      </a:lnStyleLst>
+      <a:effectStyleLst>
+        <a:effectStyle>
+          <a:effectLst/>
+        </a:effectStyle>
+        <a:effectStyle>
+          <a:effectLst/>
+        </a:effectStyle>
+        <a:effectStyle>
+          <a:effectLst>
+            <a:outerShdw blurRad="57150" dist="19050" dir="5400000" algn="ctr" rotWithShape="0">
+              <a:srgbClr val="000000">
+                <a:alpha val="63000"/>
+              </a:srgbClr>
+            </a:outerShdw>
+          </a:effectLst>
+        </a:effectStyle>
+      </a:effectStyleLst>
+      <a:bgFillStyleLst>
+        <a:solidFill>
+          <a:schemeClr val="phClr"/>
+        </a:solidFill>
+        <a:solidFill>
+          <a:schemeClr val="phClr">
+            <a:tint val="95000"/>
+            <a:satMod val="170000"/>
+          </a:schemeClr>
+        </a:solidFill>
+        <a:gradFill rotWithShape="1">
+          <a:gsLst>
+            <a:gs pos="0">
+              <a:schemeClr val="phClr">
+                <a:tint val="93000"/>
+                <a:satMod val="150000"/>
+                <a:shade val="98000"/>
+                <a:lumMod val="102000"/>
+              </a:schemeClr>
+            </a:gs>
+            <a:gs pos="50000">
+              <a:schemeClr val="phClr">
+                <a:tint val="98000"/>
+                <a:satMod val="130000"/>
+                <a:shade val="90000"/>
+                <a:lumMod val="103000"/>
+              </a:schemeClr>
+            </a:gs>
+            <a:gs pos="100000">
+              <a:schemeClr val="phClr">
+                <a:shade val="63000"/>
+                <a:satMod val="120000"/>
+              </a:schemeClr>
+            </a:gs>
+          </a:gsLst>
+          <a:lin ang="5400000" scaled="0"/>
+        </a:gradFill>
+      </a:bgFillStyleLst>
+    </a:fmtScheme>
+  </a:themeElements>
+  <a:objectDefaults/>
+  <a:extraClrSchemeLst/>
+  <a:extLst>
+    <a:ext uri="{05A4C25C-085E-4340-85A3-A5531E510DB2}">
+      <thm15:themeFamily xmlns:thm15="http://schemas.microsoft.com/office/thememl/2012/main" name="Office Theme" id="{62F939B6-93AF-4DB8-9C6B-D6C7DFDC589F}" vid="{4A3C46E8-61CC-4603-A589-7422A47A8E4A}"/>
+    </a:ext>
+  </a:extLst>
+</a:theme>
 </file>
</xml_diff>